<commit_message>
Adds Comm flow, goals, fpga config to midterm presentation
</commit_message>
<xml_diff>
--- a/doc/MidTerm.pptx
+++ b/doc/MidTerm.pptx
@@ -9,10 +9,10 @@
     <p:sldId id="266" r:id="rId3"/>
     <p:sldId id="260" r:id="rId4"/>
     <p:sldId id="259" r:id="rId5"/>
-    <p:sldId id="261" r:id="rId6"/>
-    <p:sldId id="262" r:id="rId7"/>
+    <p:sldId id="262" r:id="rId6"/>
+    <p:sldId id="265" r:id="rId7"/>
     <p:sldId id="263" r:id="rId8"/>
-    <p:sldId id="265" r:id="rId9"/>
+    <p:sldId id="261" r:id="rId9"/>
     <p:sldId id="264" r:id="rId10"/>
     <p:sldId id="257" r:id="rId11"/>
     <p:sldId id="267" r:id="rId12"/>
@@ -116,7 +116,18 @@
   </p:defaultTextStyle>
   <p:extLst>
     <p:ext uri="{EFAFB233-063F-42B5-8137-9DF3F51BA10A}">
-      <p15:sldGuideLst xmlns:p15="http://schemas.microsoft.com/office/powerpoint/2012/main" xmlns=""/>
+      <p15:sldGuideLst xmlns:p15="http://schemas.microsoft.com/office/powerpoint/2012/main">
+        <p15:guide id="1" orient="horz" pos="2160">
+          <p15:clr>
+            <a:srgbClr val="A4A3A4"/>
+          </p15:clr>
+        </p15:guide>
+        <p15:guide id="2" pos="3840">
+          <p15:clr>
+            <a:srgbClr val="A4A3A4"/>
+          </p15:clr>
+        </p15:guide>
+      </p15:sldGuideLst>
     </p:ext>
   </p:extLst>
 </p:presentation>
@@ -348,7 +359,7 @@
           <a:p>
             <a:fld id="{7D245CBA-5440-4E3A-93BD-41E2FFACF6C3}" type="datetimeFigureOut">
               <a:rPr lang="de-DE" smtClean="0"/>
-              <a:t>25.05.14</a:t>
+              <a:t>26.05.2014</a:t>
             </a:fld>
             <a:endParaRPr lang="de-DE"/>
           </a:p>
@@ -390,7 +401,7 @@
           <a:p>
             <a:fld id="{19A2A861-15C4-4629-B6A2-6C8A398F0482}" type="slidenum">
               <a:rPr lang="de-DE" smtClean="0"/>
-              <a:t>‹Nr.›</a:t>
+              <a:t>‹#›</a:t>
             </a:fld>
             <a:endParaRPr lang="de-DE"/>
           </a:p>
@@ -556,7 +567,7 @@
           <a:p>
             <a:fld id="{7D245CBA-5440-4E3A-93BD-41E2FFACF6C3}" type="datetimeFigureOut">
               <a:rPr lang="de-DE" smtClean="0"/>
-              <a:t>25.05.14</a:t>
+              <a:t>26.05.2014</a:t>
             </a:fld>
             <a:endParaRPr lang="de-DE"/>
           </a:p>
@@ -598,7 +609,7 @@
           <a:p>
             <a:fld id="{19A2A861-15C4-4629-B6A2-6C8A398F0482}" type="slidenum">
               <a:rPr lang="de-DE" smtClean="0"/>
-              <a:t>‹Nr.›</a:t>
+              <a:t>‹#›</a:t>
             </a:fld>
             <a:endParaRPr lang="de-DE"/>
           </a:p>
@@ -812,7 +823,7 @@
           <a:p>
             <a:fld id="{7D245CBA-5440-4E3A-93BD-41E2FFACF6C3}" type="datetimeFigureOut">
               <a:rPr lang="de-DE" smtClean="0"/>
-              <a:t>25.05.14</a:t>
+              <a:t>26.05.2014</a:t>
             </a:fld>
             <a:endParaRPr lang="de-DE"/>
           </a:p>
@@ -854,7 +865,7 @@
           <a:p>
             <a:fld id="{19A2A861-15C4-4629-B6A2-6C8A398F0482}" type="slidenum">
               <a:rPr lang="de-DE" smtClean="0"/>
-              <a:t>‹Nr.›</a:t>
+              <a:t>‹#›</a:t>
             </a:fld>
             <a:endParaRPr lang="de-DE"/>
           </a:p>
@@ -986,7 +997,7 @@
           <a:p>
             <a:fld id="{7D245CBA-5440-4E3A-93BD-41E2FFACF6C3}" type="datetimeFigureOut">
               <a:rPr lang="de-DE" smtClean="0"/>
-              <a:t>25.05.14</a:t>
+              <a:t>26.05.2014</a:t>
             </a:fld>
             <a:endParaRPr lang="de-DE"/>
           </a:p>
@@ -1028,7 +1039,7 @@
           <a:p>
             <a:fld id="{19A2A861-15C4-4629-B6A2-6C8A398F0482}" type="slidenum">
               <a:rPr lang="de-DE" smtClean="0"/>
-              <a:t>‹Nr.›</a:t>
+              <a:t>‹#›</a:t>
             </a:fld>
             <a:endParaRPr lang="de-DE"/>
           </a:p>
@@ -1329,7 +1340,7 @@
           <a:p>
             <a:fld id="{7D245CBA-5440-4E3A-93BD-41E2FFACF6C3}" type="datetimeFigureOut">
               <a:rPr lang="de-DE" smtClean="0"/>
-              <a:t>25.05.14</a:t>
+              <a:t>26.05.2014</a:t>
             </a:fld>
             <a:endParaRPr lang="de-DE"/>
           </a:p>
@@ -1371,7 +1382,7 @@
           <a:p>
             <a:fld id="{19A2A861-15C4-4629-B6A2-6C8A398F0482}" type="slidenum">
               <a:rPr lang="de-DE" smtClean="0"/>
-              <a:t>‹Nr.›</a:t>
+              <a:t>‹#›</a:t>
             </a:fld>
             <a:endParaRPr lang="de-DE"/>
           </a:p>
@@ -1604,7 +1615,7 @@
           <a:p>
             <a:fld id="{7D245CBA-5440-4E3A-93BD-41E2FFACF6C3}" type="datetimeFigureOut">
               <a:rPr lang="de-DE" smtClean="0"/>
-              <a:t>25.05.14</a:t>
+              <a:t>26.05.2014</a:t>
             </a:fld>
             <a:endParaRPr lang="de-DE"/>
           </a:p>
@@ -1646,7 +1657,7 @@
           <a:p>
             <a:fld id="{19A2A861-15C4-4629-B6A2-6C8A398F0482}" type="slidenum">
               <a:rPr lang="de-DE" smtClean="0"/>
-              <a:t>‹Nr.›</a:t>
+              <a:t>‹#›</a:t>
             </a:fld>
             <a:endParaRPr lang="de-DE"/>
           </a:p>
@@ -1983,7 +1994,7 @@
           <a:p>
             <a:fld id="{7D245CBA-5440-4E3A-93BD-41E2FFACF6C3}" type="datetimeFigureOut">
               <a:rPr lang="de-DE" smtClean="0"/>
-              <a:t>25.05.14</a:t>
+              <a:t>26.05.2014</a:t>
             </a:fld>
             <a:endParaRPr lang="de-DE"/>
           </a:p>
@@ -2025,7 +2036,7 @@
           <a:p>
             <a:fld id="{19A2A861-15C4-4629-B6A2-6C8A398F0482}" type="slidenum">
               <a:rPr lang="de-DE" smtClean="0"/>
-              <a:t>‹Nr.›</a:t>
+              <a:t>‹#›</a:t>
             </a:fld>
             <a:endParaRPr lang="de-DE"/>
           </a:p>
@@ -2101,7 +2112,7 @@
           <a:p>
             <a:fld id="{7D245CBA-5440-4E3A-93BD-41E2FFACF6C3}" type="datetimeFigureOut">
               <a:rPr lang="de-DE" smtClean="0"/>
-              <a:t>25.05.14</a:t>
+              <a:t>26.05.2014</a:t>
             </a:fld>
             <a:endParaRPr lang="de-DE"/>
           </a:p>
@@ -2143,7 +2154,7 @@
           <a:p>
             <a:fld id="{19A2A861-15C4-4629-B6A2-6C8A398F0482}" type="slidenum">
               <a:rPr lang="de-DE" smtClean="0"/>
-              <a:t>‹Nr.›</a:t>
+              <a:t>‹#›</a:t>
             </a:fld>
             <a:endParaRPr lang="de-DE"/>
           </a:p>
@@ -2272,7 +2283,7 @@
           <a:p>
             <a:fld id="{7D245CBA-5440-4E3A-93BD-41E2FFACF6C3}" type="datetimeFigureOut">
               <a:rPr lang="de-DE" smtClean="0"/>
-              <a:t>25.05.14</a:t>
+              <a:t>26.05.2014</a:t>
             </a:fld>
             <a:endParaRPr lang="de-DE"/>
           </a:p>
@@ -2322,7 +2333,7 @@
           <a:p>
             <a:fld id="{19A2A861-15C4-4629-B6A2-6C8A398F0482}" type="slidenum">
               <a:rPr lang="de-DE" smtClean="0"/>
-              <a:t>‹Nr.›</a:t>
+              <a:t>‹#›</a:t>
             </a:fld>
             <a:endParaRPr lang="de-DE"/>
           </a:p>
@@ -2626,7 +2637,7 @@
           <a:p>
             <a:fld id="{7D245CBA-5440-4E3A-93BD-41E2FFACF6C3}" type="datetimeFigureOut">
               <a:rPr lang="de-DE" smtClean="0"/>
-              <a:t>25.05.14</a:t>
+              <a:t>26.05.2014</a:t>
             </a:fld>
             <a:endParaRPr lang="de-DE"/>
           </a:p>
@@ -2689,7 +2700,7 @@
           <a:p>
             <a:fld id="{19A2A861-15C4-4629-B6A2-6C8A398F0482}" type="slidenum">
               <a:rPr lang="de-DE" smtClean="0"/>
-              <a:t>‹Nr.›</a:t>
+              <a:t>‹#›</a:t>
             </a:fld>
             <a:endParaRPr lang="de-DE"/>
           </a:p>
@@ -3008,7 +3019,7 @@
           <a:p>
             <a:fld id="{7D245CBA-5440-4E3A-93BD-41E2FFACF6C3}" type="datetimeFigureOut">
               <a:rPr lang="de-DE" smtClean="0"/>
-              <a:t>25.05.14</a:t>
+              <a:t>26.05.2014</a:t>
             </a:fld>
             <a:endParaRPr lang="de-DE"/>
           </a:p>
@@ -3050,7 +3061,7 @@
           <a:p>
             <a:fld id="{19A2A861-15C4-4629-B6A2-6C8A398F0482}" type="slidenum">
               <a:rPr lang="de-DE" smtClean="0"/>
-              <a:t>‹Nr.›</a:t>
+              <a:t>‹#›</a:t>
             </a:fld>
             <a:endParaRPr lang="de-DE"/>
           </a:p>
@@ -3295,7 +3306,7 @@
           <a:p>
             <a:fld id="{7D245CBA-5440-4E3A-93BD-41E2FFACF6C3}" type="datetimeFigureOut">
               <a:rPr lang="de-DE" smtClean="0"/>
-              <a:t>25.05.14</a:t>
+              <a:t>26.05.2014</a:t>
             </a:fld>
             <a:endParaRPr lang="de-DE"/>
           </a:p>
@@ -3369,7 +3380,7 @@
           <a:p>
             <a:fld id="{19A2A861-15C4-4629-B6A2-6C8A398F0482}" type="slidenum">
               <a:rPr lang="de-DE" smtClean="0"/>
-              <a:t>‹Nr.›</a:t>
+              <a:t>‹#›</a:t>
             </a:fld>
             <a:endParaRPr lang="de-DE"/>
           </a:p>
@@ -3878,7 +3889,7 @@
   <p:timing>
     <p:tnLst>
       <p:par>
-        <p:cTn xmlns:p14="http://schemas.microsoft.com/office/powerpoint/2010/main" id="1" dur="indefinite" restart="never" nodeType="tmRoot"/>
+        <p:cTn id="1" dur="indefinite" restart="never" nodeType="tmRoot"/>
       </p:par>
     </p:tnLst>
   </p:timing>
@@ -4153,7 +4164,7 @@
   <p:timing>
     <p:tnLst>
       <p:par>
-        <p:cTn xmlns:p14="http://schemas.microsoft.com/office/powerpoint/2010/main" id="1" dur="indefinite" restart="never" nodeType="tmRoot"/>
+        <p:cTn id="1" dur="indefinite" restart="never" nodeType="tmRoot"/>
       </p:par>
     </p:tnLst>
   </p:timing>
@@ -4402,7 +4413,7 @@
           <a:p>
             <a:r>
               <a:rPr lang="de-DE" dirty="0" smtClean="0"/>
-              <a:t>Zielsetzung/Aufgabenstellung</a:t>
+              <a:t>Project goal</a:t>
             </a:r>
             <a:endParaRPr lang="de-DE" dirty="0"/>
           </a:p>
@@ -4420,10 +4431,53 @@
         </p:nvSpPr>
         <p:spPr/>
         <p:txBody>
-          <a:bodyPr/>
+          <a:bodyPr>
+            <a:normAutofit/>
+          </a:bodyPr>
           <a:lstStyle/>
           <a:p>
-            <a:endParaRPr lang="de-DE"/>
+            <a:pPr>
+              <a:buFont typeface="Wingdings" panose="05000000000000000000" pitchFamily="2" charset="2"/>
+              <a:buChar char="§"/>
+            </a:pPr>
+            <a:r>
+              <a:rPr lang="de-DE" sz="2400" dirty="0" smtClean="0"/>
+              <a:t> allow cars to communicate with each other and with control stations</a:t>
+            </a:r>
+          </a:p>
+          <a:p>
+            <a:pPr>
+              <a:buFont typeface="Wingdings" panose="05000000000000000000" pitchFamily="2" charset="2"/>
+              <a:buChar char="§"/>
+            </a:pPr>
+            <a:r>
+              <a:rPr lang="de-DE" sz="2400" dirty="0" smtClean="0"/>
+              <a:t> exchange diagnostics</a:t>
+            </a:r>
+          </a:p>
+          <a:p>
+            <a:pPr>
+              <a:buFont typeface="Wingdings" panose="05000000000000000000" pitchFamily="2" charset="2"/>
+              <a:buChar char="§"/>
+            </a:pPr>
+            <a:r>
+              <a:rPr lang="de-DE" sz="2400" dirty="0" smtClean="0"/>
+              <a:t> receive situational information and emergency broadcasts</a:t>
+            </a:r>
+          </a:p>
+          <a:p>
+            <a:endParaRPr lang="de-DE" sz="2400" dirty="0"/>
+          </a:p>
+          <a:p>
+            <a:pPr>
+              <a:buFont typeface="Wingdings" panose="05000000000000000000" pitchFamily="2" charset="2"/>
+              <a:buChar char="Ø"/>
+            </a:pPr>
+            <a:r>
+              <a:rPr lang="de-DE" sz="2400" dirty="0" smtClean="0"/>
+              <a:t>information gain leads to improved path planning and car control</a:t>
+            </a:r>
+            <a:endParaRPr lang="de-DE" sz="2400" dirty="0"/>
           </a:p>
         </p:txBody>
       </p:sp>
@@ -4440,7 +4494,7 @@
   <p:timing>
     <p:tnLst>
       <p:par>
-        <p:cTn xmlns:p14="http://schemas.microsoft.com/office/powerpoint/2010/main" id="1" dur="indefinite" restart="never" nodeType="tmRoot"/>
+        <p:cTn id="1" dur="indefinite" restart="never" nodeType="tmRoot"/>
       </p:par>
     </p:tnLst>
   </p:timing>
@@ -4615,7 +4669,7 @@
   <p:timing>
     <p:tnLst>
       <p:par>
-        <p:cTn xmlns:p14="http://schemas.microsoft.com/office/powerpoint/2010/main" id="1" dur="indefinite" restart="never" nodeType="tmRoot"/>
+        <p:cTn id="1" dur="indefinite" restart="never" nodeType="tmRoot"/>
       </p:par>
     </p:tnLst>
   </p:timing>
@@ -4694,7 +4748,7 @@
   <p:timing>
     <p:tnLst>
       <p:par>
-        <p:cTn xmlns:p14="http://schemas.microsoft.com/office/powerpoint/2010/main" id="1" dur="indefinite" restart="never" nodeType="tmRoot"/>
+        <p:cTn id="1" dur="indefinite" restart="never" nodeType="tmRoot"/>
       </p:par>
     </p:tnLst>
   </p:timing>
@@ -4735,7 +4789,7 @@
           <a:p>
             <a:r>
               <a:rPr lang="de-DE" dirty="0" smtClean="0"/>
-              <a:t>Hardware Aufbau</a:t>
+              <a:t>Hardware setup</a:t>
             </a:r>
             <a:endParaRPr lang="de-DE" dirty="0"/>
           </a:p>
@@ -4763,7 +4817,7 @@
     </p:spTree>
     <p:extLst>
       <p:ext uri="{BB962C8B-B14F-4D97-AF65-F5344CB8AC3E}">
-        <p14:creationId xmlns:p14="http://schemas.microsoft.com/office/powerpoint/2010/main" val="1140190393"/>
+        <p14:creationId xmlns:p14="http://schemas.microsoft.com/office/powerpoint/2010/main" val="1412353464"/>
       </p:ext>
     </p:extLst>
   </p:cSld>
@@ -4773,7 +4827,7 @@
   <p:timing>
     <p:tnLst>
       <p:par>
-        <p:cTn xmlns:p14="http://schemas.microsoft.com/office/powerpoint/2010/main" id="1" dur="indefinite" restart="never" nodeType="tmRoot"/>
+        <p:cTn id="1" dur="indefinite" restart="never" nodeType="tmRoot"/>
       </p:par>
     </p:tnLst>
   </p:timing>
@@ -4813,40 +4867,139 @@
           <a:lstStyle/>
           <a:p>
             <a:r>
-              <a:rPr lang="de-DE" dirty="0" err="1" smtClean="0"/>
-              <a:t>Com</a:t>
-            </a:r>
-            <a:r>
               <a:rPr lang="de-DE" dirty="0" smtClean="0"/>
-              <a:t> Fluss</a:t>
+              <a:t>FPGA Configuration</a:t>
             </a:r>
             <a:endParaRPr lang="de-DE" dirty="0"/>
           </a:p>
         </p:txBody>
       </p:sp>
-      <p:sp>
-        <p:nvSpPr>
-          <p:cNvPr id="3" name="Inhaltsplatzhalter 2"/>
+      <p:pic>
+        <p:nvPicPr>
+          <p:cNvPr id="4" name="Content Placeholder 3"/>
+          <p:cNvPicPr>
+            <a:picLocks noGrp="1" noChangeAspect="1"/>
+          </p:cNvPicPr>
+          <p:nvPr>
+            <p:ph sz="half" idx="1"/>
+          </p:nvPr>
+        </p:nvPicPr>
+        <p:blipFill rotWithShape="1">
+          <a:blip r:embed="rId2">
+            <a:extLst>
+              <a:ext uri="{28A0092B-C50C-407E-A947-70E740481C1C}">
+                <a14:useLocalDpi xmlns:a14="http://schemas.microsoft.com/office/drawing/2010/main" val="0"/>
+              </a:ext>
+            </a:extLst>
+          </a:blip>
+          <a:srcRect r="44411"/>
+          <a:stretch/>
+        </p:blipFill>
+        <p:spPr>
+          <a:xfrm>
+            <a:off x="6527945" y="2002629"/>
+            <a:ext cx="4361728" cy="3927926"/>
+          </a:xfrm>
+        </p:spPr>
+      </p:pic>
+      <p:sp>
+        <p:nvSpPr>
+          <p:cNvPr id="5" name="Content Placeholder 4"/>
           <p:cNvSpPr>
             <a:spLocks noGrp="1"/>
           </p:cNvSpPr>
           <p:nvPr>
-            <p:ph idx="1"/>
+            <p:ph sz="half" idx="2"/>
           </p:nvPr>
         </p:nvSpPr>
-        <p:spPr/>
+        <p:spPr>
+          <a:xfrm>
+            <a:off x="1097280" y="2445974"/>
+            <a:ext cx="4937760" cy="2800156"/>
+          </a:xfrm>
+        </p:spPr>
         <p:txBody>
           <a:bodyPr/>
           <a:lstStyle/>
           <a:p>
-            <a:endParaRPr lang="de-DE"/>
+            <a:pPr>
+              <a:buFont typeface="Wingdings" panose="05000000000000000000" pitchFamily="2" charset="2"/>
+              <a:buChar char="§"/>
+            </a:pPr>
+            <a:r>
+              <a:rPr lang="en-US" dirty="0" smtClean="0"/>
+              <a:t> 2x </a:t>
+            </a:r>
+            <a:r>
+              <a:rPr lang="en-US" dirty="0" err="1" smtClean="0"/>
+              <a:t>NiosII</a:t>
+            </a:r>
+            <a:r>
+              <a:rPr lang="en-US" dirty="0" smtClean="0"/>
+              <a:t> CPUs (each with their own JTAG, data/instruction memory)</a:t>
+            </a:r>
+          </a:p>
+          <a:p>
+            <a:pPr>
+              <a:buFont typeface="Wingdings" panose="05000000000000000000" pitchFamily="2" charset="2"/>
+              <a:buChar char="§"/>
+            </a:pPr>
+            <a:r>
+              <a:rPr lang="en-US" dirty="0"/>
+              <a:t> </a:t>
+            </a:r>
+            <a:r>
+              <a:rPr lang="en-US" dirty="0" smtClean="0"/>
+              <a:t>1x shared memory for inter-core communication</a:t>
+            </a:r>
+          </a:p>
+          <a:p>
+            <a:pPr>
+              <a:buFont typeface="Wingdings" panose="05000000000000000000" pitchFamily="2" charset="2"/>
+              <a:buChar char="§"/>
+            </a:pPr>
+            <a:r>
+              <a:rPr lang="en-US" dirty="0"/>
+              <a:t> </a:t>
+            </a:r>
+            <a:r>
+              <a:rPr lang="en-US" dirty="0" smtClean="0"/>
+              <a:t>Hardware </a:t>
+            </a:r>
+            <a:r>
+              <a:rPr lang="en-US" dirty="0" err="1" smtClean="0"/>
+              <a:t>mutexes</a:t>
+            </a:r>
+            <a:r>
+              <a:rPr lang="en-US" dirty="0"/>
+              <a:t> </a:t>
+            </a:r>
+            <a:r>
+              <a:rPr lang="en-US" dirty="0" smtClean="0"/>
+              <a:t>for different shared memory areas</a:t>
+            </a:r>
+          </a:p>
+          <a:p>
+            <a:pPr>
+              <a:buFont typeface="Wingdings" panose="05000000000000000000" pitchFamily="2" charset="2"/>
+              <a:buChar char="§"/>
+            </a:pPr>
+            <a:r>
+              <a:rPr lang="en-US" dirty="0"/>
+              <a:t> </a:t>
+            </a:r>
+            <a:r>
+              <a:rPr lang="en-US" dirty="0" smtClean="0"/>
+              <a:t>Ethernet peripheral</a:t>
+            </a:r>
+            <a:endParaRPr lang="en-US" dirty="0"/>
           </a:p>
         </p:txBody>
       </p:sp>
     </p:spTree>
     <p:extLst>
       <p:ext uri="{BB962C8B-B14F-4D97-AF65-F5344CB8AC3E}">
-        <p14:creationId xmlns:p14="http://schemas.microsoft.com/office/powerpoint/2010/main" val="1412353464"/>
+        <p14:creationId xmlns:p14="http://schemas.microsoft.com/office/powerpoint/2010/main" val="2081165741"/>
       </p:ext>
     </p:extLst>
   </p:cSld>
@@ -4856,7 +5009,7 @@
   <p:timing>
     <p:tnLst>
       <p:par>
-        <p:cTn xmlns:p14="http://schemas.microsoft.com/office/powerpoint/2010/main" id="1" dur="indefinite" restart="never" nodeType="tmRoot"/>
+        <p:cTn id="1" dur="indefinite" restart="never" nodeType="tmRoot"/>
       </p:par>
     </p:tnLst>
   </p:timing>
@@ -5120,7 +5273,7 @@
   <p:timing>
     <p:tnLst>
       <p:par>
-        <p:cTn xmlns:p14="http://schemas.microsoft.com/office/powerpoint/2010/main" id="1" dur="indefinite" restart="never" nodeType="tmRoot"/>
+        <p:cTn id="1" dur="indefinite" restart="never" nodeType="tmRoot"/>
       </p:par>
     </p:tnLst>
   </p:timing>
@@ -5161,15 +5314,7 @@
           <a:p>
             <a:r>
               <a:rPr lang="de-DE" dirty="0" smtClean="0"/>
-              <a:t>Hardware </a:t>
-            </a:r>
-            <a:r>
-              <a:rPr lang="de-DE" dirty="0" err="1" smtClean="0"/>
-              <a:t>Conf</a:t>
-            </a:r>
-            <a:r>
-              <a:rPr lang="de-DE" dirty="0" smtClean="0"/>
-              <a:t> FPGA</a:t>
+              <a:t>Comm flow</a:t>
             </a:r>
             <a:endParaRPr lang="de-DE" dirty="0"/>
           </a:p>
@@ -5177,27 +5322,1782 @@
       </p:sp>
       <p:sp>
         <p:nvSpPr>
-          <p:cNvPr id="3" name="Inhaltsplatzhalter 2"/>
-          <p:cNvSpPr>
-            <a:spLocks noGrp="1"/>
-          </p:cNvSpPr>
-          <p:nvPr>
-            <p:ph idx="1"/>
-          </p:nvPr>
-        </p:nvSpPr>
-        <p:spPr/>
+          <p:cNvPr id="13" name="Freeform 12"/>
+          <p:cNvSpPr/>
+          <p:nvPr/>
+        </p:nvSpPr>
+        <p:spPr>
+          <a:xfrm>
+            <a:off x="8978087" y="4647771"/>
+            <a:ext cx="1817038" cy="961419"/>
+          </a:xfrm>
+          <a:custGeom>
+            <a:avLst/>
+            <a:gdLst>
+              <a:gd name="connsiteX0" fmla="*/ 0 w 3094136"/>
+              <a:gd name="connsiteY0" fmla="*/ 0 h 1856482"/>
+              <a:gd name="connsiteX1" fmla="*/ 3094136 w 3094136"/>
+              <a:gd name="connsiteY1" fmla="*/ 0 h 1856482"/>
+              <a:gd name="connsiteX2" fmla="*/ 3094136 w 3094136"/>
+              <a:gd name="connsiteY2" fmla="*/ 1856482 h 1856482"/>
+              <a:gd name="connsiteX3" fmla="*/ 0 w 3094136"/>
+              <a:gd name="connsiteY3" fmla="*/ 1856482 h 1856482"/>
+              <a:gd name="connsiteX4" fmla="*/ 0 w 3094136"/>
+              <a:gd name="connsiteY4" fmla="*/ 0 h 1856482"/>
+            </a:gdLst>
+            <a:ahLst/>
+            <a:cxnLst>
+              <a:cxn ang="0">
+                <a:pos x="connsiteX0" y="connsiteY0"/>
+              </a:cxn>
+              <a:cxn ang="0">
+                <a:pos x="connsiteX1" y="connsiteY1"/>
+              </a:cxn>
+              <a:cxn ang="0">
+                <a:pos x="connsiteX2" y="connsiteY2"/>
+              </a:cxn>
+              <a:cxn ang="0">
+                <a:pos x="connsiteX3" y="connsiteY3"/>
+              </a:cxn>
+              <a:cxn ang="0">
+                <a:pos x="connsiteX4" y="connsiteY4"/>
+              </a:cxn>
+            </a:cxnLst>
+            <a:rect l="l" t="t" r="r" b="b"/>
+            <a:pathLst>
+              <a:path w="3094136" h="1856482">
+                <a:moveTo>
+                  <a:pt x="0" y="0"/>
+                </a:moveTo>
+                <a:lnTo>
+                  <a:pt x="3094136" y="0"/>
+                </a:lnTo>
+                <a:lnTo>
+                  <a:pt x="3094136" y="1856482"/>
+                </a:lnTo>
+                <a:lnTo>
+                  <a:pt x="0" y="1856482"/>
+                </a:lnTo>
+                <a:lnTo>
+                  <a:pt x="0" y="0"/>
+                </a:lnTo>
+                <a:close/>
+              </a:path>
+            </a:pathLst>
+          </a:custGeom>
+          <a:solidFill>
+            <a:schemeClr val="bg2">
+              <a:lumMod val="50000"/>
+            </a:schemeClr>
+          </a:solidFill>
+        </p:spPr>
+        <p:style>
+          <a:lnRef idx="2">
+            <a:schemeClr val="lt1">
+              <a:hueOff val="0"/>
+              <a:satOff val="0"/>
+              <a:lumOff val="0"/>
+              <a:alphaOff val="0"/>
+            </a:schemeClr>
+          </a:lnRef>
+          <a:fillRef idx="1">
+            <a:schemeClr val="accent1">
+              <a:hueOff val="0"/>
+              <a:satOff val="0"/>
+              <a:lumOff val="0"/>
+              <a:alphaOff val="0"/>
+            </a:schemeClr>
+          </a:fillRef>
+          <a:effectRef idx="0">
+            <a:schemeClr val="accent1">
+              <a:hueOff val="0"/>
+              <a:satOff val="0"/>
+              <a:lumOff val="0"/>
+              <a:alphaOff val="0"/>
+            </a:schemeClr>
+          </a:effectRef>
+          <a:fontRef idx="minor">
+            <a:schemeClr val="lt1"/>
+          </a:fontRef>
+        </p:style>
         <p:txBody>
-          <a:bodyPr/>
+          <a:bodyPr spcFirstLastPara="0" vert="horz" wrap="square" lIns="247650" tIns="247650" rIns="247650" bIns="247650" numCol="1" spcCol="1270" anchor="ctr" anchorCtr="0">
+            <a:noAutofit/>
+          </a:bodyPr>
           <a:lstStyle/>
           <a:p>
-            <a:endParaRPr lang="de-DE"/>
+            <a:pPr lvl="0" algn="ctr" defTabSz="2889250">
+              <a:lnSpc>
+                <a:spcPct val="90000"/>
+              </a:lnSpc>
+              <a:spcBef>
+                <a:spcPct val="0"/>
+              </a:spcBef>
+              <a:spcAft>
+                <a:spcPct val="35000"/>
+              </a:spcAft>
+            </a:pPr>
+            <a:r>
+              <a:rPr lang="en-US" sz="2400" kern="1200" dirty="0" smtClean="0"/>
+              <a:t>Image processing</a:t>
+            </a:r>
+            <a:endParaRPr lang="en-US" sz="2400" kern="1200" dirty="0"/>
           </a:p>
         </p:txBody>
       </p:sp>
+      <p:sp>
+        <p:nvSpPr>
+          <p:cNvPr id="16" name="Freeform 15"/>
+          <p:cNvSpPr/>
+          <p:nvPr/>
+        </p:nvSpPr>
+        <p:spPr>
+          <a:xfrm>
+            <a:off x="8978087" y="2429944"/>
+            <a:ext cx="1817038" cy="961419"/>
+          </a:xfrm>
+          <a:custGeom>
+            <a:avLst/>
+            <a:gdLst>
+              <a:gd name="connsiteX0" fmla="*/ 0 w 3094136"/>
+              <a:gd name="connsiteY0" fmla="*/ 0 h 1856482"/>
+              <a:gd name="connsiteX1" fmla="*/ 3094136 w 3094136"/>
+              <a:gd name="connsiteY1" fmla="*/ 0 h 1856482"/>
+              <a:gd name="connsiteX2" fmla="*/ 3094136 w 3094136"/>
+              <a:gd name="connsiteY2" fmla="*/ 1856482 h 1856482"/>
+              <a:gd name="connsiteX3" fmla="*/ 0 w 3094136"/>
+              <a:gd name="connsiteY3" fmla="*/ 1856482 h 1856482"/>
+              <a:gd name="connsiteX4" fmla="*/ 0 w 3094136"/>
+              <a:gd name="connsiteY4" fmla="*/ 0 h 1856482"/>
+            </a:gdLst>
+            <a:ahLst/>
+            <a:cxnLst>
+              <a:cxn ang="0">
+                <a:pos x="connsiteX0" y="connsiteY0"/>
+              </a:cxn>
+              <a:cxn ang="0">
+                <a:pos x="connsiteX1" y="connsiteY1"/>
+              </a:cxn>
+              <a:cxn ang="0">
+                <a:pos x="connsiteX2" y="connsiteY2"/>
+              </a:cxn>
+              <a:cxn ang="0">
+                <a:pos x="connsiteX3" y="connsiteY3"/>
+              </a:cxn>
+              <a:cxn ang="0">
+                <a:pos x="connsiteX4" y="connsiteY4"/>
+              </a:cxn>
+            </a:cxnLst>
+            <a:rect l="l" t="t" r="r" b="b"/>
+            <a:pathLst>
+              <a:path w="3094136" h="1856482">
+                <a:moveTo>
+                  <a:pt x="0" y="0"/>
+                </a:moveTo>
+                <a:lnTo>
+                  <a:pt x="3094136" y="0"/>
+                </a:lnTo>
+                <a:lnTo>
+                  <a:pt x="3094136" y="1856482"/>
+                </a:lnTo>
+                <a:lnTo>
+                  <a:pt x="0" y="1856482"/>
+                </a:lnTo>
+                <a:lnTo>
+                  <a:pt x="0" y="0"/>
+                </a:lnTo>
+                <a:close/>
+              </a:path>
+            </a:pathLst>
+          </a:custGeom>
+        </p:spPr>
+        <p:style>
+          <a:lnRef idx="2">
+            <a:schemeClr val="lt1">
+              <a:hueOff val="0"/>
+              <a:satOff val="0"/>
+              <a:lumOff val="0"/>
+              <a:alphaOff val="0"/>
+            </a:schemeClr>
+          </a:lnRef>
+          <a:fillRef idx="1">
+            <a:schemeClr val="accent1">
+              <a:hueOff val="0"/>
+              <a:satOff val="0"/>
+              <a:lumOff val="0"/>
+              <a:alphaOff val="0"/>
+            </a:schemeClr>
+          </a:fillRef>
+          <a:effectRef idx="0">
+            <a:schemeClr val="accent1">
+              <a:hueOff val="0"/>
+              <a:satOff val="0"/>
+              <a:lumOff val="0"/>
+              <a:alphaOff val="0"/>
+            </a:schemeClr>
+          </a:effectRef>
+          <a:fontRef idx="minor">
+            <a:schemeClr val="lt1"/>
+          </a:fontRef>
+        </p:style>
+        <p:txBody>
+          <a:bodyPr spcFirstLastPara="0" vert="horz" wrap="square" lIns="247650" tIns="247650" rIns="247650" bIns="247650" numCol="1" spcCol="1270" anchor="ctr" anchorCtr="0">
+            <a:noAutofit/>
+          </a:bodyPr>
+          <a:lstStyle/>
+          <a:p>
+            <a:pPr lvl="0" algn="ctr" defTabSz="2889250">
+              <a:lnSpc>
+                <a:spcPct val="90000"/>
+              </a:lnSpc>
+              <a:spcBef>
+                <a:spcPct val="0"/>
+              </a:spcBef>
+              <a:spcAft>
+                <a:spcPct val="35000"/>
+              </a:spcAft>
+            </a:pPr>
+            <a:r>
+              <a:rPr lang="en-US" sz="2400" kern="1200" dirty="0" smtClean="0"/>
+              <a:t>Motor controllers</a:t>
+            </a:r>
+            <a:endParaRPr lang="en-US" sz="2400" kern="1200" dirty="0"/>
+          </a:p>
+        </p:txBody>
+      </p:sp>
+      <p:sp>
+        <p:nvSpPr>
+          <p:cNvPr id="17" name="Freeform 16"/>
+          <p:cNvSpPr/>
+          <p:nvPr/>
+        </p:nvSpPr>
+        <p:spPr>
+          <a:xfrm>
+            <a:off x="8978087" y="3538857"/>
+            <a:ext cx="1817038" cy="961420"/>
+          </a:xfrm>
+          <a:custGeom>
+            <a:avLst/>
+            <a:gdLst>
+              <a:gd name="connsiteX0" fmla="*/ 0 w 3094136"/>
+              <a:gd name="connsiteY0" fmla="*/ 0 h 1856482"/>
+              <a:gd name="connsiteX1" fmla="*/ 3094136 w 3094136"/>
+              <a:gd name="connsiteY1" fmla="*/ 0 h 1856482"/>
+              <a:gd name="connsiteX2" fmla="*/ 3094136 w 3094136"/>
+              <a:gd name="connsiteY2" fmla="*/ 1856482 h 1856482"/>
+              <a:gd name="connsiteX3" fmla="*/ 0 w 3094136"/>
+              <a:gd name="connsiteY3" fmla="*/ 1856482 h 1856482"/>
+              <a:gd name="connsiteX4" fmla="*/ 0 w 3094136"/>
+              <a:gd name="connsiteY4" fmla="*/ 0 h 1856482"/>
+            </a:gdLst>
+            <a:ahLst/>
+            <a:cxnLst>
+              <a:cxn ang="0">
+                <a:pos x="connsiteX0" y="connsiteY0"/>
+              </a:cxn>
+              <a:cxn ang="0">
+                <a:pos x="connsiteX1" y="connsiteY1"/>
+              </a:cxn>
+              <a:cxn ang="0">
+                <a:pos x="connsiteX2" y="connsiteY2"/>
+              </a:cxn>
+              <a:cxn ang="0">
+                <a:pos x="connsiteX3" y="connsiteY3"/>
+              </a:cxn>
+              <a:cxn ang="0">
+                <a:pos x="connsiteX4" y="connsiteY4"/>
+              </a:cxn>
+            </a:cxnLst>
+            <a:rect l="l" t="t" r="r" b="b"/>
+            <a:pathLst>
+              <a:path w="3094136" h="1856482">
+                <a:moveTo>
+                  <a:pt x="0" y="0"/>
+                </a:moveTo>
+                <a:lnTo>
+                  <a:pt x="3094136" y="0"/>
+                </a:lnTo>
+                <a:lnTo>
+                  <a:pt x="3094136" y="1856482"/>
+                </a:lnTo>
+                <a:lnTo>
+                  <a:pt x="0" y="1856482"/>
+                </a:lnTo>
+                <a:lnTo>
+                  <a:pt x="0" y="0"/>
+                </a:lnTo>
+                <a:close/>
+              </a:path>
+            </a:pathLst>
+          </a:custGeom>
+        </p:spPr>
+        <p:style>
+          <a:lnRef idx="2">
+            <a:schemeClr val="lt1">
+              <a:hueOff val="0"/>
+              <a:satOff val="0"/>
+              <a:lumOff val="0"/>
+              <a:alphaOff val="0"/>
+            </a:schemeClr>
+          </a:lnRef>
+          <a:fillRef idx="1">
+            <a:schemeClr val="accent1">
+              <a:hueOff val="0"/>
+              <a:satOff val="0"/>
+              <a:lumOff val="0"/>
+              <a:alphaOff val="0"/>
+            </a:schemeClr>
+          </a:fillRef>
+          <a:effectRef idx="0">
+            <a:schemeClr val="accent1">
+              <a:hueOff val="0"/>
+              <a:satOff val="0"/>
+              <a:lumOff val="0"/>
+              <a:alphaOff val="0"/>
+            </a:schemeClr>
+          </a:effectRef>
+          <a:fontRef idx="minor">
+            <a:schemeClr val="lt1"/>
+          </a:fontRef>
+        </p:style>
+        <p:txBody>
+          <a:bodyPr spcFirstLastPara="0" vert="horz" wrap="square" lIns="247650" tIns="247650" rIns="247650" bIns="247650" numCol="1" spcCol="1270" anchor="ctr" anchorCtr="0">
+            <a:noAutofit/>
+          </a:bodyPr>
+          <a:lstStyle/>
+          <a:p>
+            <a:pPr lvl="0" algn="ctr" defTabSz="2889250">
+              <a:lnSpc>
+                <a:spcPct val="90000"/>
+              </a:lnSpc>
+              <a:spcBef>
+                <a:spcPct val="0"/>
+              </a:spcBef>
+              <a:spcAft>
+                <a:spcPct val="35000"/>
+              </a:spcAft>
+            </a:pPr>
+            <a:r>
+              <a:rPr lang="en-US" sz="2800" kern="1200" dirty="0" err="1" smtClean="0"/>
+              <a:t>WiPort</a:t>
+            </a:r>
+            <a:endParaRPr lang="en-US" sz="2800" kern="1200" dirty="0"/>
+          </a:p>
+        </p:txBody>
+      </p:sp>
+      <p:sp>
+        <p:nvSpPr>
+          <p:cNvPr id="18" name="Freeform 17"/>
+          <p:cNvSpPr/>
+          <p:nvPr/>
+        </p:nvSpPr>
+        <p:spPr>
+          <a:xfrm>
+            <a:off x="6178884" y="3538857"/>
+            <a:ext cx="1817038" cy="961419"/>
+          </a:xfrm>
+          <a:custGeom>
+            <a:avLst/>
+            <a:gdLst>
+              <a:gd name="connsiteX0" fmla="*/ 0 w 3094136"/>
+              <a:gd name="connsiteY0" fmla="*/ 0 h 1856482"/>
+              <a:gd name="connsiteX1" fmla="*/ 3094136 w 3094136"/>
+              <a:gd name="connsiteY1" fmla="*/ 0 h 1856482"/>
+              <a:gd name="connsiteX2" fmla="*/ 3094136 w 3094136"/>
+              <a:gd name="connsiteY2" fmla="*/ 1856482 h 1856482"/>
+              <a:gd name="connsiteX3" fmla="*/ 0 w 3094136"/>
+              <a:gd name="connsiteY3" fmla="*/ 1856482 h 1856482"/>
+              <a:gd name="connsiteX4" fmla="*/ 0 w 3094136"/>
+              <a:gd name="connsiteY4" fmla="*/ 0 h 1856482"/>
+            </a:gdLst>
+            <a:ahLst/>
+            <a:cxnLst>
+              <a:cxn ang="0">
+                <a:pos x="connsiteX0" y="connsiteY0"/>
+              </a:cxn>
+              <a:cxn ang="0">
+                <a:pos x="connsiteX1" y="connsiteY1"/>
+              </a:cxn>
+              <a:cxn ang="0">
+                <a:pos x="connsiteX2" y="connsiteY2"/>
+              </a:cxn>
+              <a:cxn ang="0">
+                <a:pos x="connsiteX3" y="connsiteY3"/>
+              </a:cxn>
+              <a:cxn ang="0">
+                <a:pos x="connsiteX4" y="connsiteY4"/>
+              </a:cxn>
+            </a:cxnLst>
+            <a:rect l="l" t="t" r="r" b="b"/>
+            <a:pathLst>
+              <a:path w="3094136" h="1856482">
+                <a:moveTo>
+                  <a:pt x="0" y="0"/>
+                </a:moveTo>
+                <a:lnTo>
+                  <a:pt x="3094136" y="0"/>
+                </a:lnTo>
+                <a:lnTo>
+                  <a:pt x="3094136" y="1856482"/>
+                </a:lnTo>
+                <a:lnTo>
+                  <a:pt x="0" y="1856482"/>
+                </a:lnTo>
+                <a:lnTo>
+                  <a:pt x="0" y="0"/>
+                </a:lnTo>
+                <a:close/>
+              </a:path>
+            </a:pathLst>
+          </a:custGeom>
+        </p:spPr>
+        <p:style>
+          <a:lnRef idx="2">
+            <a:schemeClr val="lt1">
+              <a:hueOff val="0"/>
+              <a:satOff val="0"/>
+              <a:lumOff val="0"/>
+              <a:alphaOff val="0"/>
+            </a:schemeClr>
+          </a:lnRef>
+          <a:fillRef idx="1">
+            <a:schemeClr val="accent1">
+              <a:hueOff val="0"/>
+              <a:satOff val="0"/>
+              <a:lumOff val="0"/>
+              <a:alphaOff val="0"/>
+            </a:schemeClr>
+          </a:fillRef>
+          <a:effectRef idx="0">
+            <a:schemeClr val="accent1">
+              <a:hueOff val="0"/>
+              <a:satOff val="0"/>
+              <a:lumOff val="0"/>
+              <a:alphaOff val="0"/>
+            </a:schemeClr>
+          </a:effectRef>
+          <a:fontRef idx="minor">
+            <a:schemeClr val="lt1"/>
+          </a:fontRef>
+        </p:style>
+        <p:txBody>
+          <a:bodyPr spcFirstLastPara="0" vert="horz" wrap="square" lIns="247650" tIns="247650" rIns="247650" bIns="247650" numCol="1" spcCol="1270" anchor="ctr" anchorCtr="0">
+            <a:noAutofit/>
+          </a:bodyPr>
+          <a:lstStyle/>
+          <a:p>
+            <a:pPr lvl="0" algn="ctr" defTabSz="2889250">
+              <a:lnSpc>
+                <a:spcPct val="90000"/>
+              </a:lnSpc>
+              <a:spcBef>
+                <a:spcPct val="0"/>
+              </a:spcBef>
+              <a:spcAft>
+                <a:spcPct val="35000"/>
+              </a:spcAft>
+            </a:pPr>
+            <a:r>
+              <a:rPr lang="en-US" sz="2800" dirty="0" smtClean="0"/>
+              <a:t>Switch</a:t>
+            </a:r>
+            <a:endParaRPr lang="en-US" sz="2800" kern="1200" dirty="0"/>
+          </a:p>
+        </p:txBody>
+      </p:sp>
+      <p:cxnSp>
+        <p:nvCxnSpPr>
+          <p:cNvPr id="23" name="Straight Connector 22"/>
+          <p:cNvCxnSpPr/>
+          <p:nvPr/>
+        </p:nvCxnSpPr>
+        <p:spPr>
+          <a:xfrm>
+            <a:off x="5810546" y="4037893"/>
+            <a:ext cx="368338" cy="0"/>
+          </a:xfrm>
+          <a:prstGeom prst="line">
+            <a:avLst/>
+          </a:prstGeom>
+          <a:ln>
+            <a:headEnd type="none"/>
+            <a:tailEnd type="triangle"/>
+          </a:ln>
+        </p:spPr>
+        <p:style>
+          <a:lnRef idx="2">
+            <a:schemeClr val="dk1"/>
+          </a:lnRef>
+          <a:fillRef idx="0">
+            <a:schemeClr val="dk1"/>
+          </a:fillRef>
+          <a:effectRef idx="1">
+            <a:schemeClr val="dk1"/>
+          </a:effectRef>
+          <a:fontRef idx="minor">
+            <a:schemeClr val="tx1"/>
+          </a:fontRef>
+        </p:style>
+      </p:cxnSp>
+      <p:grpSp>
+        <p:nvGrpSpPr>
+          <p:cNvPr id="53" name="Group 52"/>
+          <p:cNvGrpSpPr/>
+          <p:nvPr/>
+        </p:nvGrpSpPr>
+        <p:grpSpPr>
+          <a:xfrm>
+            <a:off x="7995922" y="2910653"/>
+            <a:ext cx="982165" cy="2217827"/>
+            <a:chOff x="6855134" y="2892035"/>
+            <a:chExt cx="982165" cy="2217827"/>
+          </a:xfrm>
+        </p:grpSpPr>
+        <p:cxnSp>
+          <p:nvCxnSpPr>
+            <p:cNvPr id="36" name="Straight Connector 35"/>
+            <p:cNvCxnSpPr/>
+            <p:nvPr/>
+          </p:nvCxnSpPr>
+          <p:spPr>
+            <a:xfrm>
+              <a:off x="6855134" y="4000948"/>
+              <a:ext cx="982165" cy="0"/>
+            </a:xfrm>
+            <a:prstGeom prst="line">
+              <a:avLst/>
+            </a:prstGeom>
+            <a:ln>
+              <a:headEnd type="triangle"/>
+              <a:tailEnd type="triangle"/>
+            </a:ln>
+          </p:spPr>
+          <p:style>
+            <a:lnRef idx="2">
+              <a:schemeClr val="dk1"/>
+            </a:lnRef>
+            <a:fillRef idx="0">
+              <a:schemeClr val="dk1"/>
+            </a:fillRef>
+            <a:effectRef idx="1">
+              <a:schemeClr val="dk1"/>
+            </a:effectRef>
+            <a:fontRef idx="minor">
+              <a:schemeClr val="tx1"/>
+            </a:fontRef>
+          </p:style>
+        </p:cxnSp>
+        <p:grpSp>
+          <p:nvGrpSpPr>
+            <p:cNvPr id="51" name="Group 50"/>
+            <p:cNvGrpSpPr/>
+            <p:nvPr/>
+          </p:nvGrpSpPr>
+          <p:grpSpPr>
+            <a:xfrm>
+              <a:off x="6855134" y="2892035"/>
+              <a:ext cx="982165" cy="861135"/>
+              <a:chOff x="6855134" y="2892035"/>
+              <a:chExt cx="982165" cy="861135"/>
+            </a:xfrm>
+          </p:grpSpPr>
+          <p:cxnSp>
+            <p:nvCxnSpPr>
+              <p:cNvPr id="41" name="Straight Connector 40"/>
+              <p:cNvCxnSpPr/>
+              <p:nvPr/>
+            </p:nvCxnSpPr>
+            <p:spPr>
+              <a:xfrm>
+                <a:off x="7339945" y="2892035"/>
+                <a:ext cx="497354" cy="0"/>
+              </a:xfrm>
+              <a:prstGeom prst="line">
+                <a:avLst/>
+              </a:prstGeom>
+              <a:ln>
+                <a:tailEnd type="triangle"/>
+              </a:ln>
+            </p:spPr>
+            <p:style>
+              <a:lnRef idx="2">
+                <a:schemeClr val="dk1"/>
+              </a:lnRef>
+              <a:fillRef idx="0">
+                <a:schemeClr val="dk1"/>
+              </a:fillRef>
+              <a:effectRef idx="1">
+                <a:schemeClr val="dk1"/>
+              </a:effectRef>
+              <a:fontRef idx="minor">
+                <a:schemeClr val="tx1"/>
+              </a:fontRef>
+            </p:style>
+          </p:cxnSp>
+          <p:cxnSp>
+            <p:nvCxnSpPr>
+              <p:cNvPr id="45" name="Straight Connector 44"/>
+              <p:cNvCxnSpPr/>
+              <p:nvPr/>
+            </p:nvCxnSpPr>
+            <p:spPr>
+              <a:xfrm flipV="1">
+                <a:off x="7333674" y="2892035"/>
+                <a:ext cx="6271" cy="861135"/>
+              </a:xfrm>
+              <a:prstGeom prst="line">
+                <a:avLst/>
+              </a:prstGeom>
+            </p:spPr>
+            <p:style>
+              <a:lnRef idx="2">
+                <a:schemeClr val="dk1"/>
+              </a:lnRef>
+              <a:fillRef idx="0">
+                <a:schemeClr val="dk1"/>
+              </a:fillRef>
+              <a:effectRef idx="1">
+                <a:schemeClr val="dk1"/>
+              </a:effectRef>
+              <a:fontRef idx="minor">
+                <a:schemeClr val="tx1"/>
+              </a:fontRef>
+            </p:style>
+          </p:cxnSp>
+          <p:cxnSp>
+            <p:nvCxnSpPr>
+              <p:cNvPr id="47" name="Straight Connector 46"/>
+              <p:cNvCxnSpPr/>
+              <p:nvPr/>
+            </p:nvCxnSpPr>
+            <p:spPr>
+              <a:xfrm flipH="1">
+                <a:off x="6855134" y="3753170"/>
+                <a:ext cx="478540" cy="0"/>
+              </a:xfrm>
+              <a:prstGeom prst="line">
+                <a:avLst/>
+              </a:prstGeom>
+              <a:ln>
+                <a:headEnd type="none"/>
+                <a:tailEnd type="triangle"/>
+              </a:ln>
+            </p:spPr>
+            <p:style>
+              <a:lnRef idx="2">
+                <a:schemeClr val="dk1"/>
+              </a:lnRef>
+              <a:fillRef idx="0">
+                <a:schemeClr val="dk1"/>
+              </a:fillRef>
+              <a:effectRef idx="1">
+                <a:schemeClr val="dk1"/>
+              </a:effectRef>
+              <a:fontRef idx="minor">
+                <a:schemeClr val="tx1"/>
+              </a:fontRef>
+            </p:style>
+          </p:cxnSp>
+        </p:grpSp>
+        <p:grpSp>
+          <p:nvGrpSpPr>
+            <p:cNvPr id="52" name="Group 51"/>
+            <p:cNvGrpSpPr/>
+            <p:nvPr/>
+          </p:nvGrpSpPr>
+          <p:grpSpPr>
+            <a:xfrm>
+              <a:off x="6855134" y="4248727"/>
+              <a:ext cx="982165" cy="861135"/>
+              <a:chOff x="6855134" y="4248727"/>
+              <a:chExt cx="982165" cy="861135"/>
+            </a:xfrm>
+          </p:grpSpPr>
+          <p:cxnSp>
+            <p:nvCxnSpPr>
+              <p:cNvPr id="38" name="Straight Connector 37"/>
+              <p:cNvCxnSpPr/>
+              <p:nvPr/>
+            </p:nvCxnSpPr>
+            <p:spPr>
+              <a:xfrm flipV="1">
+                <a:off x="7346217" y="4248727"/>
+                <a:ext cx="6271" cy="861135"/>
+              </a:xfrm>
+              <a:prstGeom prst="line">
+                <a:avLst/>
+              </a:prstGeom>
+            </p:spPr>
+            <p:style>
+              <a:lnRef idx="2">
+                <a:schemeClr val="dk1"/>
+              </a:lnRef>
+              <a:fillRef idx="0">
+                <a:schemeClr val="dk1"/>
+              </a:fillRef>
+              <a:effectRef idx="1">
+                <a:schemeClr val="dk1"/>
+              </a:effectRef>
+              <a:fontRef idx="minor">
+                <a:schemeClr val="tx1"/>
+              </a:fontRef>
+            </p:style>
+          </p:cxnSp>
+          <p:cxnSp>
+            <p:nvCxnSpPr>
+              <p:cNvPr id="43" name="Straight Connector 42"/>
+              <p:cNvCxnSpPr/>
+              <p:nvPr/>
+            </p:nvCxnSpPr>
+            <p:spPr>
+              <a:xfrm>
+                <a:off x="7346216" y="5109862"/>
+                <a:ext cx="491083" cy="0"/>
+              </a:xfrm>
+              <a:prstGeom prst="line">
+                <a:avLst/>
+              </a:prstGeom>
+              <a:ln>
+                <a:tailEnd type="triangle"/>
+              </a:ln>
+            </p:spPr>
+            <p:style>
+              <a:lnRef idx="2">
+                <a:schemeClr val="dk1"/>
+              </a:lnRef>
+              <a:fillRef idx="0">
+                <a:schemeClr val="dk1"/>
+              </a:fillRef>
+              <a:effectRef idx="1">
+                <a:schemeClr val="dk1"/>
+              </a:effectRef>
+              <a:fontRef idx="minor">
+                <a:schemeClr val="tx1"/>
+              </a:fontRef>
+            </p:style>
+          </p:cxnSp>
+          <p:cxnSp>
+            <p:nvCxnSpPr>
+              <p:cNvPr id="49" name="Straight Connector 48"/>
+              <p:cNvCxnSpPr/>
+              <p:nvPr/>
+            </p:nvCxnSpPr>
+            <p:spPr>
+              <a:xfrm flipH="1">
+                <a:off x="6855134" y="4248727"/>
+                <a:ext cx="491082" cy="0"/>
+              </a:xfrm>
+              <a:prstGeom prst="line">
+                <a:avLst/>
+              </a:prstGeom>
+              <a:ln>
+                <a:tailEnd type="triangle"/>
+              </a:ln>
+            </p:spPr>
+            <p:style>
+              <a:lnRef idx="2">
+                <a:schemeClr val="dk1"/>
+              </a:lnRef>
+              <a:fillRef idx="0">
+                <a:schemeClr val="dk1"/>
+              </a:fillRef>
+              <a:effectRef idx="1">
+                <a:schemeClr val="dk1"/>
+              </a:effectRef>
+              <a:fontRef idx="minor">
+                <a:schemeClr val="tx1"/>
+              </a:fontRef>
+            </p:style>
+          </p:cxnSp>
+        </p:grpSp>
+      </p:grpSp>
+      <p:grpSp>
+        <p:nvGrpSpPr>
+          <p:cNvPr id="75" name="Group 74"/>
+          <p:cNvGrpSpPr/>
+          <p:nvPr/>
+        </p:nvGrpSpPr>
+        <p:grpSpPr>
+          <a:xfrm>
+            <a:off x="1896418" y="2494452"/>
+            <a:ext cx="3889677" cy="2518872"/>
+            <a:chOff x="166255" y="2884401"/>
+            <a:chExt cx="3889677" cy="2518872"/>
+          </a:xfrm>
+        </p:grpSpPr>
+        <p:grpSp>
+          <p:nvGrpSpPr>
+            <p:cNvPr id="54" name="Group 53"/>
+            <p:cNvGrpSpPr/>
+            <p:nvPr/>
+          </p:nvGrpSpPr>
+          <p:grpSpPr>
+            <a:xfrm>
+              <a:off x="166255" y="2884401"/>
+              <a:ext cx="3889677" cy="2518872"/>
+              <a:chOff x="1273938" y="2983981"/>
+              <a:chExt cx="2781993" cy="2217827"/>
+            </a:xfrm>
+          </p:grpSpPr>
+          <p:sp>
+            <p:nvSpPr>
+              <p:cNvPr id="15" name="Freeform 14"/>
+              <p:cNvSpPr/>
+              <p:nvPr/>
+            </p:nvSpPr>
+            <p:spPr>
+              <a:xfrm>
+                <a:off x="1273938" y="2983981"/>
+                <a:ext cx="2781993" cy="2217827"/>
+              </a:xfrm>
+              <a:custGeom>
+                <a:avLst/>
+                <a:gdLst>
+                  <a:gd name="connsiteX0" fmla="*/ 0 w 3094136"/>
+                  <a:gd name="connsiteY0" fmla="*/ 0 h 1856482"/>
+                  <a:gd name="connsiteX1" fmla="*/ 3094136 w 3094136"/>
+                  <a:gd name="connsiteY1" fmla="*/ 0 h 1856482"/>
+                  <a:gd name="connsiteX2" fmla="*/ 3094136 w 3094136"/>
+                  <a:gd name="connsiteY2" fmla="*/ 1856482 h 1856482"/>
+                  <a:gd name="connsiteX3" fmla="*/ 0 w 3094136"/>
+                  <a:gd name="connsiteY3" fmla="*/ 1856482 h 1856482"/>
+                  <a:gd name="connsiteX4" fmla="*/ 0 w 3094136"/>
+                  <a:gd name="connsiteY4" fmla="*/ 0 h 1856482"/>
+                </a:gdLst>
+                <a:ahLst/>
+                <a:cxnLst>
+                  <a:cxn ang="0">
+                    <a:pos x="connsiteX0" y="connsiteY0"/>
+                  </a:cxn>
+                  <a:cxn ang="0">
+                    <a:pos x="connsiteX1" y="connsiteY1"/>
+                  </a:cxn>
+                  <a:cxn ang="0">
+                    <a:pos x="connsiteX2" y="connsiteY2"/>
+                  </a:cxn>
+                  <a:cxn ang="0">
+                    <a:pos x="connsiteX3" y="connsiteY3"/>
+                  </a:cxn>
+                  <a:cxn ang="0">
+                    <a:pos x="connsiteX4" y="connsiteY4"/>
+                  </a:cxn>
+                </a:cxnLst>
+                <a:rect l="l" t="t" r="r" b="b"/>
+                <a:pathLst>
+                  <a:path w="3094136" h="1856482">
+                    <a:moveTo>
+                      <a:pt x="0" y="0"/>
+                    </a:moveTo>
+                    <a:lnTo>
+                      <a:pt x="3094136" y="0"/>
+                    </a:lnTo>
+                    <a:lnTo>
+                      <a:pt x="3094136" y="1856482"/>
+                    </a:lnTo>
+                    <a:lnTo>
+                      <a:pt x="0" y="1856482"/>
+                    </a:lnTo>
+                    <a:lnTo>
+                      <a:pt x="0" y="0"/>
+                    </a:lnTo>
+                    <a:close/>
+                  </a:path>
+                </a:pathLst>
+              </a:custGeom>
+              <a:solidFill>
+                <a:schemeClr val="accent1">
+                  <a:lumMod val="40000"/>
+                  <a:lumOff val="60000"/>
+                </a:schemeClr>
+              </a:solidFill>
+              <a:ln w="57150">
+                <a:solidFill>
+                  <a:schemeClr val="accent1"/>
+                </a:solidFill>
+              </a:ln>
+            </p:spPr>
+            <p:style>
+              <a:lnRef idx="2">
+                <a:schemeClr val="lt1">
+                  <a:hueOff val="0"/>
+                  <a:satOff val="0"/>
+                  <a:lumOff val="0"/>
+                  <a:alphaOff val="0"/>
+                </a:schemeClr>
+              </a:lnRef>
+              <a:fillRef idx="1">
+                <a:schemeClr val="accent1">
+                  <a:hueOff val="0"/>
+                  <a:satOff val="0"/>
+                  <a:lumOff val="0"/>
+                  <a:alphaOff val="0"/>
+                </a:schemeClr>
+              </a:fillRef>
+              <a:effectRef idx="0">
+                <a:schemeClr val="accent1">
+                  <a:hueOff val="0"/>
+                  <a:satOff val="0"/>
+                  <a:lumOff val="0"/>
+                  <a:alphaOff val="0"/>
+                </a:schemeClr>
+              </a:effectRef>
+              <a:fontRef idx="minor">
+                <a:schemeClr val="lt1"/>
+              </a:fontRef>
+            </p:style>
+            <p:txBody>
+              <a:bodyPr spcFirstLastPara="0" vert="horz" wrap="square" lIns="247650" tIns="247650" rIns="247650" bIns="247650" numCol="1" spcCol="1270" anchor="t" anchorCtr="0">
+                <a:noAutofit/>
+              </a:bodyPr>
+              <a:lstStyle/>
+              <a:p>
+                <a:pPr lvl="0" algn="ctr" defTabSz="2889250">
+                  <a:lnSpc>
+                    <a:spcPct val="90000"/>
+                  </a:lnSpc>
+                  <a:spcBef>
+                    <a:spcPct val="0"/>
+                  </a:spcBef>
+                  <a:spcAft>
+                    <a:spcPct val="35000"/>
+                  </a:spcAft>
+                </a:pPr>
+                <a:r>
+                  <a:rPr lang="en-US" sz="3200" kern="1200" dirty="0" smtClean="0">
+                    <a:solidFill>
+                      <a:schemeClr val="tx1"/>
+                    </a:solidFill>
+                  </a:rPr>
+                  <a:t>Altera FPGA</a:t>
+                </a:r>
+                <a:endParaRPr lang="en-US" sz="3200" kern="1200" dirty="0">
+                  <a:solidFill>
+                    <a:schemeClr val="tx1"/>
+                  </a:solidFill>
+                </a:endParaRPr>
+              </a:p>
+            </p:txBody>
+          </p:sp>
+          <p:sp>
+            <p:nvSpPr>
+              <p:cNvPr id="19" name="Freeform 18"/>
+              <p:cNvSpPr/>
+              <p:nvPr/>
+            </p:nvSpPr>
+            <p:spPr>
+              <a:xfrm>
+                <a:off x="1939830" y="4140568"/>
+                <a:ext cx="787445" cy="396876"/>
+              </a:xfrm>
+              <a:custGeom>
+                <a:avLst/>
+                <a:gdLst>
+                  <a:gd name="connsiteX0" fmla="*/ 0 w 3094136"/>
+                  <a:gd name="connsiteY0" fmla="*/ 0 h 1856482"/>
+                  <a:gd name="connsiteX1" fmla="*/ 3094136 w 3094136"/>
+                  <a:gd name="connsiteY1" fmla="*/ 0 h 1856482"/>
+                  <a:gd name="connsiteX2" fmla="*/ 3094136 w 3094136"/>
+                  <a:gd name="connsiteY2" fmla="*/ 1856482 h 1856482"/>
+                  <a:gd name="connsiteX3" fmla="*/ 0 w 3094136"/>
+                  <a:gd name="connsiteY3" fmla="*/ 1856482 h 1856482"/>
+                  <a:gd name="connsiteX4" fmla="*/ 0 w 3094136"/>
+                  <a:gd name="connsiteY4" fmla="*/ 0 h 1856482"/>
+                </a:gdLst>
+                <a:ahLst/>
+                <a:cxnLst>
+                  <a:cxn ang="0">
+                    <a:pos x="connsiteX0" y="connsiteY0"/>
+                  </a:cxn>
+                  <a:cxn ang="0">
+                    <a:pos x="connsiteX1" y="connsiteY1"/>
+                  </a:cxn>
+                  <a:cxn ang="0">
+                    <a:pos x="connsiteX2" y="connsiteY2"/>
+                  </a:cxn>
+                  <a:cxn ang="0">
+                    <a:pos x="connsiteX3" y="connsiteY3"/>
+                  </a:cxn>
+                  <a:cxn ang="0">
+                    <a:pos x="connsiteX4" y="connsiteY4"/>
+                  </a:cxn>
+                </a:cxnLst>
+                <a:rect l="l" t="t" r="r" b="b"/>
+                <a:pathLst>
+                  <a:path w="3094136" h="1856482">
+                    <a:moveTo>
+                      <a:pt x="0" y="0"/>
+                    </a:moveTo>
+                    <a:lnTo>
+                      <a:pt x="3094136" y="0"/>
+                    </a:lnTo>
+                    <a:lnTo>
+                      <a:pt x="3094136" y="1856482"/>
+                    </a:lnTo>
+                    <a:lnTo>
+                      <a:pt x="0" y="1856482"/>
+                    </a:lnTo>
+                    <a:lnTo>
+                      <a:pt x="0" y="0"/>
+                    </a:lnTo>
+                    <a:close/>
+                  </a:path>
+                </a:pathLst>
+              </a:custGeom>
+            </p:spPr>
+            <p:style>
+              <a:lnRef idx="2">
+                <a:schemeClr val="lt1">
+                  <a:hueOff val="0"/>
+                  <a:satOff val="0"/>
+                  <a:lumOff val="0"/>
+                  <a:alphaOff val="0"/>
+                </a:schemeClr>
+              </a:lnRef>
+              <a:fillRef idx="1">
+                <a:schemeClr val="accent1">
+                  <a:hueOff val="0"/>
+                  <a:satOff val="0"/>
+                  <a:lumOff val="0"/>
+                  <a:alphaOff val="0"/>
+                </a:schemeClr>
+              </a:fillRef>
+              <a:effectRef idx="0">
+                <a:schemeClr val="accent1">
+                  <a:hueOff val="0"/>
+                  <a:satOff val="0"/>
+                  <a:lumOff val="0"/>
+                  <a:alphaOff val="0"/>
+                </a:schemeClr>
+              </a:effectRef>
+              <a:fontRef idx="minor">
+                <a:schemeClr val="lt1"/>
+              </a:fontRef>
+            </p:style>
+            <p:txBody>
+              <a:bodyPr spcFirstLastPara="0" vert="horz" wrap="square" lIns="247650" tIns="247650" rIns="247650" bIns="247650" numCol="1" spcCol="1270" anchor="ctr" anchorCtr="0">
+                <a:noAutofit/>
+              </a:bodyPr>
+              <a:lstStyle/>
+              <a:p>
+                <a:pPr lvl="0" algn="ctr" defTabSz="2889250">
+                  <a:lnSpc>
+                    <a:spcPct val="90000"/>
+                  </a:lnSpc>
+                  <a:spcBef>
+                    <a:spcPct val="0"/>
+                  </a:spcBef>
+                  <a:spcAft>
+                    <a:spcPct val="35000"/>
+                  </a:spcAft>
+                </a:pPr>
+                <a:r>
+                  <a:rPr lang="en-US" sz="1600" dirty="0" smtClean="0"/>
+                  <a:t>Core 1</a:t>
+                </a:r>
+                <a:endParaRPr lang="en-US" sz="1600" kern="1200" dirty="0"/>
+              </a:p>
+            </p:txBody>
+          </p:sp>
+          <p:sp>
+            <p:nvSpPr>
+              <p:cNvPr id="20" name="Freeform 19"/>
+              <p:cNvSpPr/>
+              <p:nvPr/>
+            </p:nvSpPr>
+            <p:spPr>
+              <a:xfrm>
+                <a:off x="1939830" y="4636663"/>
+                <a:ext cx="787445" cy="396875"/>
+              </a:xfrm>
+              <a:custGeom>
+                <a:avLst/>
+                <a:gdLst>
+                  <a:gd name="connsiteX0" fmla="*/ 0 w 3094136"/>
+                  <a:gd name="connsiteY0" fmla="*/ 0 h 1856482"/>
+                  <a:gd name="connsiteX1" fmla="*/ 3094136 w 3094136"/>
+                  <a:gd name="connsiteY1" fmla="*/ 0 h 1856482"/>
+                  <a:gd name="connsiteX2" fmla="*/ 3094136 w 3094136"/>
+                  <a:gd name="connsiteY2" fmla="*/ 1856482 h 1856482"/>
+                  <a:gd name="connsiteX3" fmla="*/ 0 w 3094136"/>
+                  <a:gd name="connsiteY3" fmla="*/ 1856482 h 1856482"/>
+                  <a:gd name="connsiteX4" fmla="*/ 0 w 3094136"/>
+                  <a:gd name="connsiteY4" fmla="*/ 0 h 1856482"/>
+                </a:gdLst>
+                <a:ahLst/>
+                <a:cxnLst>
+                  <a:cxn ang="0">
+                    <a:pos x="connsiteX0" y="connsiteY0"/>
+                  </a:cxn>
+                  <a:cxn ang="0">
+                    <a:pos x="connsiteX1" y="connsiteY1"/>
+                  </a:cxn>
+                  <a:cxn ang="0">
+                    <a:pos x="connsiteX2" y="connsiteY2"/>
+                  </a:cxn>
+                  <a:cxn ang="0">
+                    <a:pos x="connsiteX3" y="connsiteY3"/>
+                  </a:cxn>
+                  <a:cxn ang="0">
+                    <a:pos x="connsiteX4" y="connsiteY4"/>
+                  </a:cxn>
+                </a:cxnLst>
+                <a:rect l="l" t="t" r="r" b="b"/>
+                <a:pathLst>
+                  <a:path w="3094136" h="1856482">
+                    <a:moveTo>
+                      <a:pt x="0" y="0"/>
+                    </a:moveTo>
+                    <a:lnTo>
+                      <a:pt x="3094136" y="0"/>
+                    </a:lnTo>
+                    <a:lnTo>
+                      <a:pt x="3094136" y="1856482"/>
+                    </a:lnTo>
+                    <a:lnTo>
+                      <a:pt x="0" y="1856482"/>
+                    </a:lnTo>
+                    <a:lnTo>
+                      <a:pt x="0" y="0"/>
+                    </a:lnTo>
+                    <a:close/>
+                  </a:path>
+                </a:pathLst>
+              </a:custGeom>
+            </p:spPr>
+            <p:style>
+              <a:lnRef idx="2">
+                <a:schemeClr val="lt1">
+                  <a:hueOff val="0"/>
+                  <a:satOff val="0"/>
+                  <a:lumOff val="0"/>
+                  <a:alphaOff val="0"/>
+                </a:schemeClr>
+              </a:lnRef>
+              <a:fillRef idx="1">
+                <a:schemeClr val="accent1">
+                  <a:hueOff val="0"/>
+                  <a:satOff val="0"/>
+                  <a:lumOff val="0"/>
+                  <a:alphaOff val="0"/>
+                </a:schemeClr>
+              </a:fillRef>
+              <a:effectRef idx="0">
+                <a:schemeClr val="accent1">
+                  <a:hueOff val="0"/>
+                  <a:satOff val="0"/>
+                  <a:lumOff val="0"/>
+                  <a:alphaOff val="0"/>
+                </a:schemeClr>
+              </a:effectRef>
+              <a:fontRef idx="minor">
+                <a:schemeClr val="lt1"/>
+              </a:fontRef>
+            </p:style>
+            <p:txBody>
+              <a:bodyPr spcFirstLastPara="0" vert="horz" wrap="square" lIns="247650" tIns="247650" rIns="247650" bIns="247650" numCol="1" spcCol="1270" anchor="ctr" anchorCtr="0">
+                <a:noAutofit/>
+              </a:bodyPr>
+              <a:lstStyle/>
+              <a:p>
+                <a:pPr lvl="0" algn="ctr" defTabSz="2889250">
+                  <a:lnSpc>
+                    <a:spcPct val="90000"/>
+                  </a:lnSpc>
+                  <a:spcBef>
+                    <a:spcPct val="0"/>
+                  </a:spcBef>
+                  <a:spcAft>
+                    <a:spcPct val="35000"/>
+                  </a:spcAft>
+                </a:pPr>
+                <a:r>
+                  <a:rPr lang="en-US" sz="1600" dirty="0" smtClean="0"/>
+                  <a:t>Core 0</a:t>
+                </a:r>
+                <a:endParaRPr lang="en-US" sz="1600" kern="1200" dirty="0"/>
+              </a:p>
+            </p:txBody>
+          </p:sp>
+          <p:sp>
+            <p:nvSpPr>
+              <p:cNvPr id="21" name="Freeform 20"/>
+              <p:cNvSpPr/>
+              <p:nvPr/>
+            </p:nvSpPr>
+            <p:spPr>
+              <a:xfrm>
+                <a:off x="3008208" y="4140569"/>
+                <a:ext cx="716097" cy="396875"/>
+              </a:xfrm>
+              <a:custGeom>
+                <a:avLst/>
+                <a:gdLst>
+                  <a:gd name="connsiteX0" fmla="*/ 0 w 3094136"/>
+                  <a:gd name="connsiteY0" fmla="*/ 0 h 1856482"/>
+                  <a:gd name="connsiteX1" fmla="*/ 3094136 w 3094136"/>
+                  <a:gd name="connsiteY1" fmla="*/ 0 h 1856482"/>
+                  <a:gd name="connsiteX2" fmla="*/ 3094136 w 3094136"/>
+                  <a:gd name="connsiteY2" fmla="*/ 1856482 h 1856482"/>
+                  <a:gd name="connsiteX3" fmla="*/ 0 w 3094136"/>
+                  <a:gd name="connsiteY3" fmla="*/ 1856482 h 1856482"/>
+                  <a:gd name="connsiteX4" fmla="*/ 0 w 3094136"/>
+                  <a:gd name="connsiteY4" fmla="*/ 0 h 1856482"/>
+                </a:gdLst>
+                <a:ahLst/>
+                <a:cxnLst>
+                  <a:cxn ang="0">
+                    <a:pos x="connsiteX0" y="connsiteY0"/>
+                  </a:cxn>
+                  <a:cxn ang="0">
+                    <a:pos x="connsiteX1" y="connsiteY1"/>
+                  </a:cxn>
+                  <a:cxn ang="0">
+                    <a:pos x="connsiteX2" y="connsiteY2"/>
+                  </a:cxn>
+                  <a:cxn ang="0">
+                    <a:pos x="connsiteX3" y="connsiteY3"/>
+                  </a:cxn>
+                  <a:cxn ang="0">
+                    <a:pos x="connsiteX4" y="connsiteY4"/>
+                  </a:cxn>
+                </a:cxnLst>
+                <a:rect l="l" t="t" r="r" b="b"/>
+                <a:pathLst>
+                  <a:path w="3094136" h="1856482">
+                    <a:moveTo>
+                      <a:pt x="0" y="0"/>
+                    </a:moveTo>
+                    <a:lnTo>
+                      <a:pt x="3094136" y="0"/>
+                    </a:lnTo>
+                    <a:lnTo>
+                      <a:pt x="3094136" y="1856482"/>
+                    </a:lnTo>
+                    <a:lnTo>
+                      <a:pt x="0" y="1856482"/>
+                    </a:lnTo>
+                    <a:lnTo>
+                      <a:pt x="0" y="0"/>
+                    </a:lnTo>
+                    <a:close/>
+                  </a:path>
+                </a:pathLst>
+              </a:custGeom>
+            </p:spPr>
+            <p:style>
+              <a:lnRef idx="2">
+                <a:schemeClr val="lt1">
+                  <a:hueOff val="0"/>
+                  <a:satOff val="0"/>
+                  <a:lumOff val="0"/>
+                  <a:alphaOff val="0"/>
+                </a:schemeClr>
+              </a:lnRef>
+              <a:fillRef idx="1">
+                <a:schemeClr val="accent1">
+                  <a:hueOff val="0"/>
+                  <a:satOff val="0"/>
+                  <a:lumOff val="0"/>
+                  <a:alphaOff val="0"/>
+                </a:schemeClr>
+              </a:fillRef>
+              <a:effectRef idx="0">
+                <a:schemeClr val="accent1">
+                  <a:hueOff val="0"/>
+                  <a:satOff val="0"/>
+                  <a:lumOff val="0"/>
+                  <a:alphaOff val="0"/>
+                </a:schemeClr>
+              </a:effectRef>
+              <a:fontRef idx="minor">
+                <a:schemeClr val="lt1"/>
+              </a:fontRef>
+            </p:style>
+            <p:txBody>
+              <a:bodyPr spcFirstLastPara="0" vert="horz" wrap="square" lIns="247650" tIns="247650" rIns="247650" bIns="247650" numCol="1" spcCol="1270" anchor="ctr" anchorCtr="0">
+                <a:noAutofit/>
+              </a:bodyPr>
+              <a:lstStyle/>
+              <a:p>
+                <a:pPr lvl="0" algn="ctr" defTabSz="2889250">
+                  <a:lnSpc>
+                    <a:spcPct val="90000"/>
+                  </a:lnSpc>
+                  <a:spcBef>
+                    <a:spcPct val="0"/>
+                  </a:spcBef>
+                  <a:spcAft>
+                    <a:spcPct val="35000"/>
+                  </a:spcAft>
+                </a:pPr>
+                <a:r>
+                  <a:rPr lang="en-US" sz="1600" dirty="0" err="1" smtClean="0"/>
+                  <a:t>ethernet</a:t>
+                </a:r>
+                <a:endParaRPr lang="en-US" sz="1600" kern="1200" dirty="0"/>
+              </a:p>
+            </p:txBody>
+          </p:sp>
+        </p:grpSp>
+        <p:cxnSp>
+          <p:nvCxnSpPr>
+            <p:cNvPr id="61" name="Straight Connector 60"/>
+            <p:cNvCxnSpPr/>
+            <p:nvPr/>
+          </p:nvCxnSpPr>
+          <p:spPr>
+            <a:xfrm flipH="1">
+              <a:off x="3915538" y="4423355"/>
+              <a:ext cx="140393" cy="0"/>
+            </a:xfrm>
+            <a:prstGeom prst="line">
+              <a:avLst/>
+            </a:prstGeom>
+            <a:ln cap="rnd">
+              <a:prstDash val="sysDash"/>
+            </a:ln>
+          </p:spPr>
+          <p:style>
+            <a:lnRef idx="2">
+              <a:schemeClr val="dk1"/>
+            </a:lnRef>
+            <a:fillRef idx="0">
+              <a:schemeClr val="dk1"/>
+            </a:fillRef>
+            <a:effectRef idx="1">
+              <a:schemeClr val="dk1"/>
+            </a:effectRef>
+            <a:fontRef idx="minor">
+              <a:schemeClr val="tx1"/>
+            </a:fontRef>
+          </p:style>
+        </p:cxnSp>
+        <p:cxnSp>
+          <p:nvCxnSpPr>
+            <p:cNvPr id="63" name="Straight Connector 62"/>
+            <p:cNvCxnSpPr/>
+            <p:nvPr/>
+          </p:nvCxnSpPr>
+          <p:spPr>
+            <a:xfrm flipH="1">
+              <a:off x="3592265" y="4423355"/>
+              <a:ext cx="323273" cy="0"/>
+            </a:xfrm>
+            <a:prstGeom prst="line">
+              <a:avLst/>
+            </a:prstGeom>
+            <a:ln cap="rnd">
+              <a:prstDash val="sysDash"/>
+              <a:headEnd type="none"/>
+              <a:tailEnd type="triangle"/>
+            </a:ln>
+          </p:spPr>
+          <p:style>
+            <a:lnRef idx="2">
+              <a:schemeClr val="dk1"/>
+            </a:lnRef>
+            <a:fillRef idx="0">
+              <a:schemeClr val="dk1"/>
+            </a:fillRef>
+            <a:effectRef idx="1">
+              <a:schemeClr val="dk1"/>
+            </a:effectRef>
+            <a:fontRef idx="minor">
+              <a:schemeClr val="tx1"/>
+            </a:fontRef>
+          </p:style>
+        </p:cxnSp>
+        <p:cxnSp>
+          <p:nvCxnSpPr>
+            <p:cNvPr id="66" name="Straight Arrow Connector 65"/>
+            <p:cNvCxnSpPr/>
+            <p:nvPr/>
+          </p:nvCxnSpPr>
+          <p:spPr>
+            <a:xfrm flipH="1">
+              <a:off x="2198256" y="4423355"/>
+              <a:ext cx="393470" cy="0"/>
+            </a:xfrm>
+            <a:prstGeom prst="straightConnector1">
+              <a:avLst/>
+            </a:prstGeom>
+            <a:ln>
+              <a:prstDash val="sysDash"/>
+              <a:headEnd type="triangle"/>
+              <a:tailEnd type="triangle"/>
+            </a:ln>
+          </p:spPr>
+          <p:style>
+            <a:lnRef idx="2">
+              <a:schemeClr val="dk1"/>
+            </a:lnRef>
+            <a:fillRef idx="0">
+              <a:schemeClr val="dk1"/>
+            </a:fillRef>
+            <a:effectRef idx="1">
+              <a:schemeClr val="dk1"/>
+            </a:effectRef>
+            <a:fontRef idx="minor">
+              <a:schemeClr val="tx1"/>
+            </a:fontRef>
+          </p:style>
+        </p:cxnSp>
+        <p:sp>
+          <p:nvSpPr>
+            <p:cNvPr id="67" name="Freeform 66"/>
+            <p:cNvSpPr/>
+            <p:nvPr/>
+          </p:nvSpPr>
+          <p:spPr>
+            <a:xfrm>
+              <a:off x="274564" y="3634548"/>
+              <a:ext cx="499444" cy="1577614"/>
+            </a:xfrm>
+            <a:custGeom>
+              <a:avLst/>
+              <a:gdLst>
+                <a:gd name="connsiteX0" fmla="*/ 0 w 3094136"/>
+                <a:gd name="connsiteY0" fmla="*/ 0 h 1856482"/>
+                <a:gd name="connsiteX1" fmla="*/ 3094136 w 3094136"/>
+                <a:gd name="connsiteY1" fmla="*/ 0 h 1856482"/>
+                <a:gd name="connsiteX2" fmla="*/ 3094136 w 3094136"/>
+                <a:gd name="connsiteY2" fmla="*/ 1856482 h 1856482"/>
+                <a:gd name="connsiteX3" fmla="*/ 0 w 3094136"/>
+                <a:gd name="connsiteY3" fmla="*/ 1856482 h 1856482"/>
+                <a:gd name="connsiteX4" fmla="*/ 0 w 3094136"/>
+                <a:gd name="connsiteY4" fmla="*/ 0 h 1856482"/>
+              </a:gdLst>
+              <a:ahLst/>
+              <a:cxnLst>
+                <a:cxn ang="0">
+                  <a:pos x="connsiteX0" y="connsiteY0"/>
+                </a:cxn>
+                <a:cxn ang="0">
+                  <a:pos x="connsiteX1" y="connsiteY1"/>
+                </a:cxn>
+                <a:cxn ang="0">
+                  <a:pos x="connsiteX2" y="connsiteY2"/>
+                </a:cxn>
+                <a:cxn ang="0">
+                  <a:pos x="connsiteX3" y="connsiteY3"/>
+                </a:cxn>
+                <a:cxn ang="0">
+                  <a:pos x="connsiteX4" y="connsiteY4"/>
+                </a:cxn>
+              </a:cxnLst>
+              <a:rect l="l" t="t" r="r" b="b"/>
+              <a:pathLst>
+                <a:path w="3094136" h="1856482">
+                  <a:moveTo>
+                    <a:pt x="0" y="0"/>
+                  </a:moveTo>
+                  <a:lnTo>
+                    <a:pt x="3094136" y="0"/>
+                  </a:lnTo>
+                  <a:lnTo>
+                    <a:pt x="3094136" y="1856482"/>
+                  </a:lnTo>
+                  <a:lnTo>
+                    <a:pt x="0" y="1856482"/>
+                  </a:lnTo>
+                  <a:lnTo>
+                    <a:pt x="0" y="0"/>
+                  </a:lnTo>
+                  <a:close/>
+                </a:path>
+              </a:pathLst>
+            </a:custGeom>
+          </p:spPr>
+          <p:style>
+            <a:lnRef idx="2">
+              <a:schemeClr val="lt1">
+                <a:hueOff val="0"/>
+                <a:satOff val="0"/>
+                <a:lumOff val="0"/>
+                <a:alphaOff val="0"/>
+              </a:schemeClr>
+            </a:lnRef>
+            <a:fillRef idx="1">
+              <a:schemeClr val="accent1">
+                <a:hueOff val="0"/>
+                <a:satOff val="0"/>
+                <a:lumOff val="0"/>
+                <a:alphaOff val="0"/>
+              </a:schemeClr>
+            </a:fillRef>
+            <a:effectRef idx="0">
+              <a:schemeClr val="accent1">
+                <a:hueOff val="0"/>
+                <a:satOff val="0"/>
+                <a:lumOff val="0"/>
+                <a:alphaOff val="0"/>
+              </a:schemeClr>
+            </a:effectRef>
+            <a:fontRef idx="minor">
+              <a:schemeClr val="lt1"/>
+            </a:fontRef>
+          </p:style>
+          <p:txBody>
+            <a:bodyPr spcFirstLastPara="0" vert="vert270" wrap="square" lIns="247650" tIns="247650" rIns="247650" bIns="247650" numCol="1" spcCol="1270" anchor="ctr" anchorCtr="0">
+              <a:noAutofit/>
+            </a:bodyPr>
+            <a:lstStyle/>
+            <a:p>
+              <a:pPr lvl="0" algn="ctr" defTabSz="2889250">
+                <a:lnSpc>
+                  <a:spcPct val="90000"/>
+                </a:lnSpc>
+                <a:spcBef>
+                  <a:spcPct val="0"/>
+                </a:spcBef>
+                <a:spcAft>
+                  <a:spcPct val="35000"/>
+                </a:spcAft>
+              </a:pPr>
+              <a:r>
+                <a:rPr lang="en-US" sz="1600" dirty="0" smtClean="0"/>
+                <a:t>memory</a:t>
+              </a:r>
+              <a:endParaRPr lang="en-US" sz="1600" kern="1200" dirty="0"/>
+            </a:p>
+          </p:txBody>
+        </p:sp>
+        <p:cxnSp>
+          <p:nvCxnSpPr>
+            <p:cNvPr id="68" name="Straight Arrow Connector 67"/>
+            <p:cNvCxnSpPr/>
+            <p:nvPr/>
+          </p:nvCxnSpPr>
+          <p:spPr>
+            <a:xfrm flipH="1">
+              <a:off x="774008" y="4986789"/>
+              <a:ext cx="323272" cy="0"/>
+            </a:xfrm>
+            <a:prstGeom prst="straightConnector1">
+              <a:avLst/>
+            </a:prstGeom>
+            <a:ln>
+              <a:prstDash val="sysDash"/>
+              <a:headEnd type="triangle"/>
+              <a:tailEnd type="triangle"/>
+            </a:ln>
+          </p:spPr>
+          <p:style>
+            <a:lnRef idx="2">
+              <a:schemeClr val="dk1"/>
+            </a:lnRef>
+            <a:fillRef idx="0">
+              <a:schemeClr val="dk1"/>
+            </a:fillRef>
+            <a:effectRef idx="1">
+              <a:schemeClr val="dk1"/>
+            </a:effectRef>
+            <a:fontRef idx="minor">
+              <a:schemeClr val="tx1"/>
+            </a:fontRef>
+          </p:style>
+        </p:cxnSp>
+        <p:cxnSp>
+          <p:nvCxnSpPr>
+            <p:cNvPr id="70" name="Straight Arrow Connector 69"/>
+            <p:cNvCxnSpPr/>
+            <p:nvPr/>
+          </p:nvCxnSpPr>
+          <p:spPr>
+            <a:xfrm flipH="1">
+              <a:off x="774008" y="4409516"/>
+              <a:ext cx="323272" cy="0"/>
+            </a:xfrm>
+            <a:prstGeom prst="straightConnector1">
+              <a:avLst/>
+            </a:prstGeom>
+            <a:ln>
+              <a:prstDash val="sysDash"/>
+              <a:headEnd type="triangle"/>
+              <a:tailEnd type="triangle"/>
+            </a:ln>
+          </p:spPr>
+          <p:style>
+            <a:lnRef idx="2">
+              <a:schemeClr val="dk1"/>
+            </a:lnRef>
+            <a:fillRef idx="0">
+              <a:schemeClr val="dk1"/>
+            </a:fillRef>
+            <a:effectRef idx="1">
+              <a:schemeClr val="dk1"/>
+            </a:effectRef>
+            <a:fontRef idx="minor">
+              <a:schemeClr val="tx1"/>
+            </a:fontRef>
+          </p:style>
+        </p:cxnSp>
+        <p:sp>
+          <p:nvSpPr>
+            <p:cNvPr id="72" name="Freeform 71"/>
+            <p:cNvSpPr/>
+            <p:nvPr/>
+          </p:nvSpPr>
+          <p:spPr>
+            <a:xfrm>
+              <a:off x="1097280" y="3634548"/>
+              <a:ext cx="1100976" cy="450747"/>
+            </a:xfrm>
+            <a:custGeom>
+              <a:avLst/>
+              <a:gdLst>
+                <a:gd name="connsiteX0" fmla="*/ 0 w 3094136"/>
+                <a:gd name="connsiteY0" fmla="*/ 0 h 1856482"/>
+                <a:gd name="connsiteX1" fmla="*/ 3094136 w 3094136"/>
+                <a:gd name="connsiteY1" fmla="*/ 0 h 1856482"/>
+                <a:gd name="connsiteX2" fmla="*/ 3094136 w 3094136"/>
+                <a:gd name="connsiteY2" fmla="*/ 1856482 h 1856482"/>
+                <a:gd name="connsiteX3" fmla="*/ 0 w 3094136"/>
+                <a:gd name="connsiteY3" fmla="*/ 1856482 h 1856482"/>
+                <a:gd name="connsiteX4" fmla="*/ 0 w 3094136"/>
+                <a:gd name="connsiteY4" fmla="*/ 0 h 1856482"/>
+              </a:gdLst>
+              <a:ahLst/>
+              <a:cxnLst>
+                <a:cxn ang="0">
+                  <a:pos x="connsiteX0" y="connsiteY0"/>
+                </a:cxn>
+                <a:cxn ang="0">
+                  <a:pos x="connsiteX1" y="connsiteY1"/>
+                </a:cxn>
+                <a:cxn ang="0">
+                  <a:pos x="connsiteX2" y="connsiteY2"/>
+                </a:cxn>
+                <a:cxn ang="0">
+                  <a:pos x="connsiteX3" y="connsiteY3"/>
+                </a:cxn>
+                <a:cxn ang="0">
+                  <a:pos x="connsiteX4" y="connsiteY4"/>
+                </a:cxn>
+              </a:cxnLst>
+              <a:rect l="l" t="t" r="r" b="b"/>
+              <a:pathLst>
+                <a:path w="3094136" h="1856482">
+                  <a:moveTo>
+                    <a:pt x="0" y="0"/>
+                  </a:moveTo>
+                  <a:lnTo>
+                    <a:pt x="3094136" y="0"/>
+                  </a:lnTo>
+                  <a:lnTo>
+                    <a:pt x="3094136" y="1856482"/>
+                  </a:lnTo>
+                  <a:lnTo>
+                    <a:pt x="0" y="1856482"/>
+                  </a:lnTo>
+                  <a:lnTo>
+                    <a:pt x="0" y="0"/>
+                  </a:lnTo>
+                  <a:close/>
+                </a:path>
+              </a:pathLst>
+            </a:custGeom>
+            <a:solidFill>
+              <a:schemeClr val="accent1">
+                <a:lumMod val="60000"/>
+                <a:lumOff val="40000"/>
+              </a:schemeClr>
+            </a:solidFill>
+          </p:spPr>
+          <p:style>
+            <a:lnRef idx="2">
+              <a:schemeClr val="lt1">
+                <a:hueOff val="0"/>
+                <a:satOff val="0"/>
+                <a:lumOff val="0"/>
+                <a:alphaOff val="0"/>
+              </a:schemeClr>
+            </a:lnRef>
+            <a:fillRef idx="1">
+              <a:schemeClr val="accent1">
+                <a:hueOff val="0"/>
+                <a:satOff val="0"/>
+                <a:lumOff val="0"/>
+                <a:alphaOff val="0"/>
+              </a:schemeClr>
+            </a:fillRef>
+            <a:effectRef idx="0">
+              <a:schemeClr val="accent1">
+                <a:hueOff val="0"/>
+                <a:satOff val="0"/>
+                <a:lumOff val="0"/>
+                <a:alphaOff val="0"/>
+              </a:schemeClr>
+            </a:effectRef>
+            <a:fontRef idx="minor">
+              <a:schemeClr val="lt1"/>
+            </a:fontRef>
+          </p:style>
+          <p:txBody>
+            <a:bodyPr spcFirstLastPara="0" vert="horz" wrap="square" lIns="247650" tIns="247650" rIns="247650" bIns="247650" numCol="1" spcCol="1270" anchor="ctr" anchorCtr="0">
+              <a:noAutofit/>
+            </a:bodyPr>
+            <a:lstStyle/>
+            <a:p>
+              <a:pPr lvl="0" algn="ctr" defTabSz="2889250">
+                <a:lnSpc>
+                  <a:spcPct val="90000"/>
+                </a:lnSpc>
+                <a:spcBef>
+                  <a:spcPct val="0"/>
+                </a:spcBef>
+                <a:spcAft>
+                  <a:spcPct val="35000"/>
+                </a:spcAft>
+              </a:pPr>
+              <a:r>
+                <a:rPr lang="en-US" sz="1600" dirty="0" smtClean="0"/>
+                <a:t>Core 2</a:t>
+              </a:r>
+              <a:endParaRPr lang="en-US" sz="1600" kern="1200" dirty="0"/>
+            </a:p>
+          </p:txBody>
+        </p:sp>
+        <p:cxnSp>
+          <p:nvCxnSpPr>
+            <p:cNvPr id="73" name="Straight Arrow Connector 72"/>
+            <p:cNvCxnSpPr/>
+            <p:nvPr/>
+          </p:nvCxnSpPr>
+          <p:spPr>
+            <a:xfrm flipH="1">
+              <a:off x="774008" y="3859952"/>
+              <a:ext cx="323272" cy="0"/>
+            </a:xfrm>
+            <a:prstGeom prst="straightConnector1">
+              <a:avLst/>
+            </a:prstGeom>
+            <a:ln>
+              <a:prstDash val="sysDash"/>
+              <a:headEnd type="triangle"/>
+              <a:tailEnd type="triangle"/>
+            </a:ln>
+          </p:spPr>
+          <p:style>
+            <a:lnRef idx="2">
+              <a:schemeClr val="dk1"/>
+            </a:lnRef>
+            <a:fillRef idx="0">
+              <a:schemeClr val="dk1"/>
+            </a:fillRef>
+            <a:effectRef idx="1">
+              <a:schemeClr val="dk1"/>
+            </a:effectRef>
+            <a:fontRef idx="minor">
+              <a:schemeClr val="tx1"/>
+            </a:fontRef>
+          </p:style>
+        </p:cxnSp>
+      </p:grpSp>
     </p:spTree>
     <p:extLst>
       <p:ext uri="{BB962C8B-B14F-4D97-AF65-F5344CB8AC3E}">
-        <p14:creationId xmlns:p14="http://schemas.microsoft.com/office/powerpoint/2010/main" val="2081165741"/>
+        <p14:creationId xmlns:p14="http://schemas.microsoft.com/office/powerpoint/2010/main" val="1140190393"/>
       </p:ext>
     </p:extLst>
   </p:cSld>
@@ -5207,7 +7107,7 @@
   <p:timing>
     <p:tnLst>
       <p:par>
-        <p:cTn xmlns:p14="http://schemas.microsoft.com/office/powerpoint/2010/main" id="1" dur="indefinite" restart="never" nodeType="tmRoot"/>
+        <p:cTn id="1" dur="indefinite" restart="never" nodeType="tmRoot"/>
       </p:par>
     </p:tnLst>
   </p:timing>
@@ -6592,7 +8492,7 @@
   <p:timing>
     <p:tnLst>
       <p:par>
-        <p:cTn xmlns:p14="http://schemas.microsoft.com/office/powerpoint/2010/main" id="1" dur="indefinite" restart="never" nodeType="tmRoot"/>
+        <p:cTn id="1" dur="indefinite" restart="never" nodeType="tmRoot"/>
       </p:par>
     </p:tnLst>
   </p:timing>
@@ -6876,7 +8776,7 @@
   <a:extraClrSchemeLst/>
   <a:extLst>
     <a:ext uri="{05A4C25C-085E-4340-85A3-A5531E510DB2}">
-      <thm15:themeFamily xmlns:thm15="http://schemas.microsoft.com/office/thememl/2012/main" xmlns="" name="Retrospect" id="{5F128B03-DCCA-4EEB-AB3B-CF2899314A46}" vid="{3F1AAB62-24C6-49D2-8E01-B56FAC9A3DCD}"/>
+      <thm15:themeFamily xmlns:thm15="http://schemas.microsoft.com/office/thememl/2012/main" name="Retrospect" id="{5F128B03-DCCA-4EEB-AB3B-CF2899314A46}" vid="{3F1AAB62-24C6-49D2-8E01-B56FAC9A3DCD}"/>
     </a:ext>
   </a:extLst>
 </a:theme>

</xml_diff>

<commit_message>
updated final version midtermpresentation
</commit_message>
<xml_diff>
--- a/doc/MidTerm.pptx
+++ b/doc/MidTerm.pptx
@@ -400,7 +400,7 @@
           <a:p>
             <a:fld id="{19A2A861-15C4-4629-B6A2-6C8A398F0482}" type="slidenum">
               <a:rPr lang="de-DE" smtClean="0"/>
-              <a:t>‹#›</a:t>
+              <a:t>‹Nr.›</a:t>
             </a:fld>
             <a:endParaRPr lang="de-DE"/>
           </a:p>
@@ -608,7 +608,7 @@
           <a:p>
             <a:fld id="{19A2A861-15C4-4629-B6A2-6C8A398F0482}" type="slidenum">
               <a:rPr lang="de-DE" smtClean="0"/>
-              <a:t>‹#›</a:t>
+              <a:t>‹Nr.›</a:t>
             </a:fld>
             <a:endParaRPr lang="de-DE"/>
           </a:p>
@@ -864,7 +864,7 @@
           <a:p>
             <a:fld id="{19A2A861-15C4-4629-B6A2-6C8A398F0482}" type="slidenum">
               <a:rPr lang="de-DE" smtClean="0"/>
-              <a:t>‹#›</a:t>
+              <a:t>‹Nr.›</a:t>
             </a:fld>
             <a:endParaRPr lang="de-DE"/>
           </a:p>
@@ -1038,7 +1038,7 @@
           <a:p>
             <a:fld id="{19A2A861-15C4-4629-B6A2-6C8A398F0482}" type="slidenum">
               <a:rPr lang="de-DE" smtClean="0"/>
-              <a:t>‹#›</a:t>
+              <a:t>‹Nr.›</a:t>
             </a:fld>
             <a:endParaRPr lang="de-DE"/>
           </a:p>
@@ -1381,7 +1381,7 @@
           <a:p>
             <a:fld id="{19A2A861-15C4-4629-B6A2-6C8A398F0482}" type="slidenum">
               <a:rPr lang="de-DE" smtClean="0"/>
-              <a:t>‹#›</a:t>
+              <a:t>‹Nr.›</a:t>
             </a:fld>
             <a:endParaRPr lang="de-DE"/>
           </a:p>
@@ -1656,7 +1656,7 @@
           <a:p>
             <a:fld id="{19A2A861-15C4-4629-B6A2-6C8A398F0482}" type="slidenum">
               <a:rPr lang="de-DE" smtClean="0"/>
-              <a:t>‹#›</a:t>
+              <a:t>‹Nr.›</a:t>
             </a:fld>
             <a:endParaRPr lang="de-DE"/>
           </a:p>
@@ -2035,7 +2035,7 @@
           <a:p>
             <a:fld id="{19A2A861-15C4-4629-B6A2-6C8A398F0482}" type="slidenum">
               <a:rPr lang="de-DE" smtClean="0"/>
-              <a:t>‹#›</a:t>
+              <a:t>‹Nr.›</a:t>
             </a:fld>
             <a:endParaRPr lang="de-DE"/>
           </a:p>
@@ -2153,7 +2153,7 @@
           <a:p>
             <a:fld id="{19A2A861-15C4-4629-B6A2-6C8A398F0482}" type="slidenum">
               <a:rPr lang="de-DE" smtClean="0"/>
-              <a:t>‹#›</a:t>
+              <a:t>‹Nr.›</a:t>
             </a:fld>
             <a:endParaRPr lang="de-DE"/>
           </a:p>
@@ -2332,7 +2332,7 @@
           <a:p>
             <a:fld id="{19A2A861-15C4-4629-B6A2-6C8A398F0482}" type="slidenum">
               <a:rPr lang="de-DE" smtClean="0"/>
-              <a:t>‹#›</a:t>
+              <a:t>‹Nr.›</a:t>
             </a:fld>
             <a:endParaRPr lang="de-DE"/>
           </a:p>
@@ -2699,7 +2699,7 @@
           <a:p>
             <a:fld id="{19A2A861-15C4-4629-B6A2-6C8A398F0482}" type="slidenum">
               <a:rPr lang="de-DE" smtClean="0"/>
-              <a:t>‹#›</a:t>
+              <a:t>‹Nr.›</a:t>
             </a:fld>
             <a:endParaRPr lang="de-DE"/>
           </a:p>
@@ -3060,7 +3060,7 @@
           <a:p>
             <a:fld id="{19A2A861-15C4-4629-B6A2-6C8A398F0482}" type="slidenum">
               <a:rPr lang="de-DE" smtClean="0"/>
-              <a:t>‹#›</a:t>
+              <a:t>‹Nr.›</a:t>
             </a:fld>
             <a:endParaRPr lang="de-DE"/>
           </a:p>
@@ -3379,7 +3379,7 @@
           <a:p>
             <a:fld id="{19A2A861-15C4-4629-B6A2-6C8A398F0482}" type="slidenum">
               <a:rPr lang="de-DE" smtClean="0"/>
-              <a:t>‹#›</a:t>
+              <a:t>‹Nr.›</a:t>
             </a:fld>
             <a:endParaRPr lang="de-DE"/>
           </a:p>
@@ -3844,6 +3844,7 @@
           <a:bodyPr/>
           <a:lstStyle/>
           <a:p>
+            <a:pPr algn="ctr"/>
             <a:r>
               <a:rPr lang="de-DE" dirty="0" smtClean="0"/>
               <a:t>Car2X </a:t>
@@ -3871,6 +3872,50 @@
           <a:bodyPr/>
           <a:lstStyle/>
           <a:p>
+            <a:pPr algn="ctr"/>
+            <a:r>
+              <a:rPr lang="de-DE" dirty="0" smtClean="0"/>
+              <a:t>Florian Janßen, Hagen </a:t>
+            </a:r>
+            <a:r>
+              <a:rPr lang="de-DE" dirty="0" err="1" smtClean="0"/>
+              <a:t>schmidtchen</a:t>
+            </a:r>
+            <a:r>
+              <a:rPr lang="de-DE" dirty="0" smtClean="0"/>
+              <a:t>,</a:t>
+            </a:r>
+          </a:p>
+          <a:p>
+            <a:pPr algn="ctr"/>
+            <a:r>
+              <a:rPr lang="de-DE" dirty="0" err="1" smtClean="0"/>
+              <a:t>paul</a:t>
+            </a:r>
+            <a:r>
+              <a:rPr lang="de-DE" dirty="0" smtClean="0"/>
+              <a:t> </a:t>
+            </a:r>
+            <a:r>
+              <a:rPr lang="de-DE" dirty="0" err="1" smtClean="0"/>
+              <a:t>bergmann</a:t>
+            </a:r>
+            <a:r>
+              <a:rPr lang="de-DE" dirty="0" smtClean="0"/>
+              <a:t>, </a:t>
+            </a:r>
+            <a:r>
+              <a:rPr lang="de-DE" dirty="0" err="1" smtClean="0"/>
+              <a:t>johannes</a:t>
+            </a:r>
+            <a:r>
+              <a:rPr lang="de-DE" dirty="0" smtClean="0"/>
+              <a:t> </a:t>
+            </a:r>
+            <a:r>
+              <a:rPr lang="de-DE" dirty="0" err="1" smtClean="0"/>
+              <a:t>Windelen</a:t>
+            </a:r>
             <a:endParaRPr lang="de-DE" dirty="0"/>
           </a:p>
         </p:txBody>
@@ -4341,11 +4386,7 @@
             </a:pPr>
             <a:r>
               <a:rPr lang="en-US" sz="2400" dirty="0" smtClean="0"/>
-              <a:t>Planning the Car2X Protocol and the general hardware </a:t>
-            </a:r>
-            <a:r>
-              <a:rPr lang="en-US" sz="2400" dirty="0" smtClean="0"/>
-              <a:t>setup</a:t>
+              <a:t>Planning the Car2X Protocol and the general hardware setup</a:t>
             </a:r>
           </a:p>
           <a:p>
@@ -5464,11 +5505,7 @@
           <a:p>
             <a:r>
               <a:rPr lang="de-DE" dirty="0" smtClean="0"/>
-              <a:t>Communication </a:t>
-            </a:r>
-            <a:r>
-              <a:rPr lang="de-DE" dirty="0" smtClean="0"/>
-              <a:t>flow</a:t>
+              <a:t>Communication flow</a:t>
             </a:r>
             <a:endParaRPr lang="de-DE" dirty="0"/>
           </a:p>
@@ -6851,7 +6888,6 @@
                 <a:rPr lang="en-US" sz="2400" dirty="0"/>
                 <a:t>Other sensing</a:t>
               </a:r>
-              <a:endParaRPr lang="en-US" sz="2400" dirty="0"/>
             </a:p>
           </p:txBody>
         </p:sp>
@@ -7124,19 +7160,7 @@
                           <a:ea typeface="+mn-ea"/>
                           <a:cs typeface="+mn-cs"/>
                         </a:rPr>
-                        <a:t>Message ID </a:t>
-                      </a:r>
-                      <a:r>
-                        <a:rPr lang="en-GB" sz="1800" b="1" kern="1200" dirty="0" smtClean="0">
-                          <a:solidFill>
-                            <a:schemeClr val="lt1"/>
-                          </a:solidFill>
-                          <a:effectLst/>
-                          <a:latin typeface="+mn-lt"/>
-                          <a:ea typeface="+mn-ea"/>
-                          <a:cs typeface="+mn-cs"/>
-                        </a:rPr>
-                        <a:t>(</a:t>
+                        <a:t>Message ID (</a:t>
                       </a:r>
                       <a:r>
                         <a:rPr lang="de-DE" sz="1800" b="1" kern="1200" dirty="0" smtClean="0">
@@ -7148,19 +7172,7 @@
                           <a:ea typeface="+mn-ea"/>
                           <a:cs typeface="+mn-cs"/>
                         </a:rPr>
-                        <a:t>2Bytes</a:t>
-                      </a:r>
-                      <a:r>
-                        <a:rPr lang="de-DE" sz="1800" b="1" kern="1200" dirty="0" smtClean="0">
-                          <a:solidFill>
-                            <a:schemeClr val="lt1"/>
-                          </a:solidFill>
-                          <a:effectLst/>
-                          <a:latin typeface="+mn-lt"/>
-                          <a:ea typeface="+mn-ea"/>
-                          <a:cs typeface="+mn-cs"/>
-                        </a:rPr>
-                        <a:t>)</a:t>
+                        <a:t>2Bytes)</a:t>
                       </a:r>
                       <a:endParaRPr lang="de-DE" dirty="0"/>
                     </a:p>

</xml_diff>

<commit_message>
changes to communication flow slide
</commit_message>
<xml_diff>
--- a/doc/MidTerm.pptx
+++ b/doc/MidTerm.pptx
@@ -400,7 +400,7 @@
           <a:p>
             <a:fld id="{19A2A861-15C4-4629-B6A2-6C8A398F0482}" type="slidenum">
               <a:rPr lang="de-DE" smtClean="0"/>
-              <a:t>‹Nr.›</a:t>
+              <a:t>‹#›</a:t>
             </a:fld>
             <a:endParaRPr lang="de-DE"/>
           </a:p>
@@ -608,7 +608,7 @@
           <a:p>
             <a:fld id="{19A2A861-15C4-4629-B6A2-6C8A398F0482}" type="slidenum">
               <a:rPr lang="de-DE" smtClean="0"/>
-              <a:t>‹Nr.›</a:t>
+              <a:t>‹#›</a:t>
             </a:fld>
             <a:endParaRPr lang="de-DE"/>
           </a:p>
@@ -864,7 +864,7 @@
           <a:p>
             <a:fld id="{19A2A861-15C4-4629-B6A2-6C8A398F0482}" type="slidenum">
               <a:rPr lang="de-DE" smtClean="0"/>
-              <a:t>‹Nr.›</a:t>
+              <a:t>‹#›</a:t>
             </a:fld>
             <a:endParaRPr lang="de-DE"/>
           </a:p>
@@ -1038,7 +1038,7 @@
           <a:p>
             <a:fld id="{19A2A861-15C4-4629-B6A2-6C8A398F0482}" type="slidenum">
               <a:rPr lang="de-DE" smtClean="0"/>
-              <a:t>‹Nr.›</a:t>
+              <a:t>‹#›</a:t>
             </a:fld>
             <a:endParaRPr lang="de-DE"/>
           </a:p>
@@ -1381,7 +1381,7 @@
           <a:p>
             <a:fld id="{19A2A861-15C4-4629-B6A2-6C8A398F0482}" type="slidenum">
               <a:rPr lang="de-DE" smtClean="0"/>
-              <a:t>‹Nr.›</a:t>
+              <a:t>‹#›</a:t>
             </a:fld>
             <a:endParaRPr lang="de-DE"/>
           </a:p>
@@ -1656,7 +1656,7 @@
           <a:p>
             <a:fld id="{19A2A861-15C4-4629-B6A2-6C8A398F0482}" type="slidenum">
               <a:rPr lang="de-DE" smtClean="0"/>
-              <a:t>‹Nr.›</a:t>
+              <a:t>‹#›</a:t>
             </a:fld>
             <a:endParaRPr lang="de-DE"/>
           </a:p>
@@ -2035,7 +2035,7 @@
           <a:p>
             <a:fld id="{19A2A861-15C4-4629-B6A2-6C8A398F0482}" type="slidenum">
               <a:rPr lang="de-DE" smtClean="0"/>
-              <a:t>‹Nr.›</a:t>
+              <a:t>‹#›</a:t>
             </a:fld>
             <a:endParaRPr lang="de-DE"/>
           </a:p>
@@ -2153,7 +2153,7 @@
           <a:p>
             <a:fld id="{19A2A861-15C4-4629-B6A2-6C8A398F0482}" type="slidenum">
               <a:rPr lang="de-DE" smtClean="0"/>
-              <a:t>‹Nr.›</a:t>
+              <a:t>‹#›</a:t>
             </a:fld>
             <a:endParaRPr lang="de-DE"/>
           </a:p>
@@ -2332,7 +2332,7 @@
           <a:p>
             <a:fld id="{19A2A861-15C4-4629-B6A2-6C8A398F0482}" type="slidenum">
               <a:rPr lang="de-DE" smtClean="0"/>
-              <a:t>‹Nr.›</a:t>
+              <a:t>‹#›</a:t>
             </a:fld>
             <a:endParaRPr lang="de-DE"/>
           </a:p>
@@ -2699,7 +2699,7 @@
           <a:p>
             <a:fld id="{19A2A861-15C4-4629-B6A2-6C8A398F0482}" type="slidenum">
               <a:rPr lang="de-DE" smtClean="0"/>
-              <a:t>‹Nr.›</a:t>
+              <a:t>‹#›</a:t>
             </a:fld>
             <a:endParaRPr lang="de-DE"/>
           </a:p>
@@ -3060,7 +3060,7 @@
           <a:p>
             <a:fld id="{19A2A861-15C4-4629-B6A2-6C8A398F0482}" type="slidenum">
               <a:rPr lang="de-DE" smtClean="0"/>
-              <a:t>‹Nr.›</a:t>
+              <a:t>‹#›</a:t>
             </a:fld>
             <a:endParaRPr lang="de-DE"/>
           </a:p>
@@ -3379,7 +3379,7 @@
           <a:p>
             <a:fld id="{19A2A861-15C4-4629-B6A2-6C8A398F0482}" type="slidenum">
               <a:rPr lang="de-DE" smtClean="0"/>
-              <a:t>‹Nr.›</a:t>
+              <a:t>‹#›</a:t>
             </a:fld>
             <a:endParaRPr lang="de-DE"/>
           </a:p>
@@ -5369,8 +5369,8 @@
         </p:nvSpPr>
         <p:spPr>
           <a:xfrm>
-            <a:off x="1097280" y="2445974"/>
-            <a:ext cx="4937760" cy="2800156"/>
+            <a:off x="1097280" y="2445973"/>
+            <a:ext cx="4937760" cy="3016363"/>
           </a:xfrm>
         </p:spPr>
         <p:txBody>
@@ -5447,7 +5447,11 @@
             </a:r>
             <a:r>
               <a:rPr lang="en-US" sz="2400" dirty="0" smtClean="0"/>
-              <a:t>Ethernet peripheral</a:t>
+              <a:t>Ethernet </a:t>
+            </a:r>
+            <a:r>
+              <a:rPr lang="en-US" sz="2400" dirty="0" smtClean="0"/>
+              <a:t>controller</a:t>
             </a:r>
             <a:endParaRPr lang="en-US" sz="2400" dirty="0"/>
           </a:p>
@@ -5615,6 +5619,11 @@
             <a:prstGeom prst="roundRect">
               <a:avLst/>
             </a:prstGeom>
+            <a:solidFill>
+              <a:schemeClr val="bg2">
+                <a:lumMod val="50000"/>
+              </a:schemeClr>
+            </a:solidFill>
           </p:spPr>
           <p:style>
             <a:lnRef idx="2">
@@ -5684,6 +5693,9 @@
             <a:prstGeom prst="roundRect">
               <a:avLst/>
             </a:prstGeom>
+            <a:solidFill>
+              <a:schemeClr val="accent4"/>
+            </a:solidFill>
           </p:spPr>
           <p:style>
             <a:lnRef idx="2">
@@ -5732,10 +5744,10 @@
                 </a:spcAft>
               </a:pPr>
               <a:r>
-                <a:rPr lang="en-US" sz="2800" kern="1200" dirty="0" err="1" smtClean="0"/>
+                <a:rPr lang="en-US" sz="2000" kern="1200" dirty="0" err="1" smtClean="0"/>
                 <a:t>WiPort</a:t>
               </a:r>
-              <a:endParaRPr lang="en-US" sz="2800" kern="1200" dirty="0"/>
+              <a:endParaRPr lang="en-US" sz="2000" kern="1200" dirty="0"/>
             </a:p>
           </p:txBody>
         </p:sp>
@@ -5753,6 +5765,12 @@
             <a:prstGeom prst="roundRect">
               <a:avLst/>
             </a:prstGeom>
+            <a:solidFill>
+              <a:schemeClr val="tx1">
+                <a:lumMod val="65000"/>
+                <a:lumOff val="35000"/>
+              </a:schemeClr>
+            </a:solidFill>
           </p:spPr>
           <p:style>
             <a:lnRef idx="2">
@@ -5816,7 +5834,7 @@
           </p:nvCxnSpPr>
           <p:spPr>
             <a:xfrm>
-              <a:off x="5810546" y="4037893"/>
+              <a:off x="5810546" y="4025861"/>
               <a:ext cx="368338" cy="0"/>
             </a:xfrm>
             <a:prstGeom prst="line">
@@ -5851,9 +5869,9 @@
           <p:grpSpPr>
             <a:xfrm>
               <a:off x="1896418" y="2494452"/>
-              <a:ext cx="3889677" cy="2518872"/>
+              <a:ext cx="3914128" cy="2518872"/>
               <a:chOff x="166255" y="2884401"/>
-              <a:chExt cx="3889677" cy="2518872"/>
+              <a:chExt cx="3914128" cy="2518872"/>
             </a:xfrm>
           </p:grpSpPr>
           <p:grpSp>
@@ -6372,47 +6390,14 @@
           </p:grpSp>
           <p:cxnSp>
             <p:nvCxnSpPr>
-              <p:cNvPr id="61" name="Straight Connector 60"/>
-              <p:cNvCxnSpPr/>
-              <p:nvPr/>
-            </p:nvCxnSpPr>
-            <p:spPr>
-              <a:xfrm flipH="1">
-                <a:off x="3915538" y="4423355"/>
-                <a:ext cx="140393" cy="0"/>
-              </a:xfrm>
-              <a:prstGeom prst="line">
-                <a:avLst/>
-              </a:prstGeom>
-              <a:ln cap="rnd">
-                <a:prstDash val="sysDash"/>
-              </a:ln>
-            </p:spPr>
-            <p:style>
-              <a:lnRef idx="2">
-                <a:schemeClr val="dk1"/>
-              </a:lnRef>
-              <a:fillRef idx="0">
-                <a:schemeClr val="dk1"/>
-              </a:fillRef>
-              <a:effectRef idx="1">
-                <a:schemeClr val="dk1"/>
-              </a:effectRef>
-              <a:fontRef idx="minor">
-                <a:schemeClr val="tx1"/>
-              </a:fontRef>
-            </p:style>
-          </p:cxnSp>
-          <p:cxnSp>
-            <p:nvCxnSpPr>
               <p:cNvPr id="63" name="Straight Connector 62"/>
               <p:cNvCxnSpPr/>
               <p:nvPr/>
             </p:nvCxnSpPr>
             <p:spPr>
               <a:xfrm flipH="1">
-                <a:off x="3592265" y="4423355"/>
-                <a:ext cx="323273" cy="0"/>
+                <a:off x="3592266" y="4420147"/>
+                <a:ext cx="488117" cy="0"/>
               </a:xfrm>
               <a:prstGeom prst="line">
                 <a:avLst/>
@@ -6839,6 +6824,11 @@
             <a:prstGeom prst="roundRect">
               <a:avLst/>
             </a:prstGeom>
+            <a:solidFill>
+              <a:schemeClr val="bg2">
+                <a:lumMod val="50000"/>
+              </a:schemeClr>
+            </a:solidFill>
           </p:spPr>
           <p:style>
             <a:lnRef idx="2">
@@ -6887,7 +6877,7 @@
                 </a:spcAft>
               </a:pPr>
               <a:r>
-                <a:rPr lang="en-US" sz="2400" dirty="0"/>
+                <a:rPr lang="en-US" sz="2000" dirty="0"/>
                 <a:t>Other sensing</a:t>
               </a:r>
             </a:p>
@@ -6909,45 +6899,6 @@
             </a:xfrm>
             <a:prstGeom prst="bentConnector3">
               <a:avLst/>
-            </a:prstGeom>
-            <a:ln>
-              <a:headEnd type="triangle"/>
-              <a:tailEnd type="triangle"/>
-            </a:ln>
-          </p:spPr>
-          <p:style>
-            <a:lnRef idx="2">
-              <a:schemeClr val="dk1"/>
-            </a:lnRef>
-            <a:fillRef idx="0">
-              <a:schemeClr val="dk1"/>
-            </a:fillRef>
-            <a:effectRef idx="1">
-              <a:schemeClr val="dk1"/>
-            </a:effectRef>
-            <a:fontRef idx="minor">
-              <a:schemeClr val="tx1"/>
-            </a:fontRef>
-          </p:style>
-        </p:cxnSp>
-        <p:cxnSp>
-          <p:nvCxnSpPr>
-            <p:cNvPr id="10" name="Elbow Connector 9"/>
-            <p:cNvCxnSpPr>
-              <a:stCxn id="18" idx="3"/>
-              <a:endCxn id="17" idx="1"/>
-            </p:cNvCxnSpPr>
-            <p:nvPr/>
-          </p:nvCxnSpPr>
-          <p:spPr>
-            <a:xfrm>
-              <a:off x="7995922" y="4019567"/>
-              <a:ext cx="982165" cy="304958"/>
-            </a:xfrm>
-            <a:prstGeom prst="bentConnector3">
-              <a:avLst>
-                <a:gd name="adj1" fmla="val 50001"/>
-              </a:avLst>
             </a:prstGeom>
             <a:ln>
               <a:headEnd type="triangle"/>
@@ -7044,6 +6995,131 @@
           </p:style>
         </p:cxnSp>
       </p:grpSp>
+      <p:sp>
+        <p:nvSpPr>
+          <p:cNvPr id="3" name="Folded Corner 2"/>
+          <p:cNvSpPr/>
+          <p:nvPr/>
+        </p:nvSpPr>
+        <p:spPr>
+          <a:xfrm>
+            <a:off x="6323398" y="2424410"/>
+            <a:ext cx="1528010" cy="914400"/>
+          </a:xfrm>
+          <a:prstGeom prst="foldedCorner">
+            <a:avLst/>
+          </a:prstGeom>
+          <a:solidFill>
+            <a:schemeClr val="accent4">
+              <a:lumMod val="20000"/>
+              <a:lumOff val="80000"/>
+            </a:schemeClr>
+          </a:solidFill>
+        </p:spPr>
+        <p:style>
+          <a:lnRef idx="2">
+            <a:schemeClr val="accent1">
+              <a:shade val="50000"/>
+            </a:schemeClr>
+          </a:lnRef>
+          <a:fillRef idx="1">
+            <a:schemeClr val="accent1"/>
+          </a:fillRef>
+          <a:effectRef idx="0">
+            <a:schemeClr val="accent1"/>
+          </a:effectRef>
+          <a:fontRef idx="minor">
+            <a:schemeClr val="lt1"/>
+          </a:fontRef>
+        </p:style>
+        <p:txBody>
+          <a:bodyPr rtlCol="0" anchor="ctr"/>
+          <a:lstStyle/>
+          <a:p>
+            <a:r>
+              <a:rPr lang="en-US" b="1" dirty="0" smtClean="0">
+                <a:solidFill>
+                  <a:schemeClr val="tx1"/>
+                </a:solidFill>
+              </a:rPr>
+              <a:t>Telnet</a:t>
+            </a:r>
+            <a:r>
+              <a:rPr lang="en-US" dirty="0" smtClean="0">
+                <a:solidFill>
+                  <a:schemeClr val="tx1"/>
+                </a:solidFill>
+              </a:rPr>
+              <a:t> </a:t>
+            </a:r>
+            <a:r>
+              <a:rPr lang="en-US" dirty="0" err="1" smtClean="0">
+                <a:solidFill>
+                  <a:schemeClr val="tx1"/>
+                </a:solidFill>
+              </a:rPr>
+              <a:t>CarProtocol</a:t>
+            </a:r>
+            <a:endParaRPr lang="en-US" dirty="0">
+              <a:solidFill>
+                <a:schemeClr val="tx1"/>
+              </a:solidFill>
+            </a:endParaRPr>
+          </a:p>
+          <a:p>
+            <a:r>
+              <a:rPr lang="en-US" dirty="0" smtClean="0">
+                <a:solidFill>
+                  <a:schemeClr val="tx1"/>
+                </a:solidFill>
+              </a:rPr>
+              <a:t>C2xProtocol</a:t>
+            </a:r>
+            <a:endParaRPr lang="en-US" dirty="0">
+              <a:solidFill>
+                <a:schemeClr val="tx1"/>
+              </a:solidFill>
+            </a:endParaRPr>
+          </a:p>
+        </p:txBody>
+      </p:sp>
+      <p:cxnSp>
+        <p:nvCxnSpPr>
+          <p:cNvPr id="8" name="Elbow Connector 7"/>
+          <p:cNvCxnSpPr>
+            <a:stCxn id="18" idx="3"/>
+            <a:endCxn id="17" idx="1"/>
+          </p:cNvCxnSpPr>
+          <p:nvPr/>
+        </p:nvCxnSpPr>
+        <p:spPr>
+          <a:xfrm>
+            <a:off x="7995922" y="4019567"/>
+            <a:ext cx="982165" cy="304958"/>
+          </a:xfrm>
+          <a:prstGeom prst="bentConnector3">
+            <a:avLst/>
+          </a:prstGeom>
+          <a:ln>
+            <a:headEnd type="triangle"/>
+            <a:tailEnd type="triangle"/>
+          </a:ln>
+        </p:spPr>
+        <p:style>
+          <a:lnRef idx="1">
+            <a:schemeClr val="dk1"/>
+          </a:lnRef>
+          <a:fillRef idx="0">
+            <a:schemeClr val="dk1"/>
+          </a:fillRef>
+          <a:effectRef idx="0">
+            <a:schemeClr val="dk1"/>
+          </a:effectRef>
+          <a:fontRef idx="minor">
+            <a:schemeClr val="tx1"/>
+          </a:fontRef>
+        </p:style>
+      </p:cxnSp>
     </p:spTree>
     <p:extLst>
       <p:ext uri="{BB962C8B-B14F-4D97-AF65-F5344CB8AC3E}">

</xml_diff>